<commit_message>
Finish all cover test
</commit_message>
<xml_diff>
--- a/選擇權自動化.pptx
+++ b/選擇權自動化.pptx
@@ -9,6 +9,15 @@
     <p:sldId id="260" r:id="rId3"/>
     <p:sldId id="259" r:id="rId4"/>
     <p:sldId id="257" r:id="rId5"/>
+    <p:sldId id="265" r:id="rId6"/>
+    <p:sldId id="261" r:id="rId7"/>
+    <p:sldId id="263" r:id="rId8"/>
+    <p:sldId id="264" r:id="rId9"/>
+    <p:sldId id="262" r:id="rId10"/>
+    <p:sldId id="266" r:id="rId11"/>
+    <p:sldId id="269" r:id="rId12"/>
+    <p:sldId id="267" r:id="rId13"/>
+    <p:sldId id="268" r:id="rId14"/>
   </p:sldIdLst>
   <p:sldSz cx="12192000" cy="6858000"/>
   <p:notesSz cx="6858000" cy="9144000"/>
@@ -262,7 +271,7 @@
           <a:p>
             <a:fld id="{F08863E2-33C6-4A67-A414-40E7C2332897}" type="datetimeFigureOut">
               <a:rPr lang="zh-TW" altLang="en-US" smtClean="0"/>
-              <a:t>2022/11/29</a:t>
+              <a:t>2022/12/11</a:t>
             </a:fld>
             <a:endParaRPr lang="zh-TW" altLang="en-US"/>
           </a:p>
@@ -460,7 +469,7 @@
           <a:p>
             <a:fld id="{F08863E2-33C6-4A67-A414-40E7C2332897}" type="datetimeFigureOut">
               <a:rPr lang="zh-TW" altLang="en-US" smtClean="0"/>
-              <a:t>2022/11/29</a:t>
+              <a:t>2022/12/11</a:t>
             </a:fld>
             <a:endParaRPr lang="zh-TW" altLang="en-US"/>
           </a:p>
@@ -668,7 +677,7 @@
           <a:p>
             <a:fld id="{F08863E2-33C6-4A67-A414-40E7C2332897}" type="datetimeFigureOut">
               <a:rPr lang="zh-TW" altLang="en-US" smtClean="0"/>
-              <a:t>2022/11/29</a:t>
+              <a:t>2022/12/11</a:t>
             </a:fld>
             <a:endParaRPr lang="zh-TW" altLang="en-US"/>
           </a:p>
@@ -866,7 +875,7 @@
           <a:p>
             <a:fld id="{F08863E2-33C6-4A67-A414-40E7C2332897}" type="datetimeFigureOut">
               <a:rPr lang="zh-TW" altLang="en-US" smtClean="0"/>
-              <a:t>2022/11/29</a:t>
+              <a:t>2022/12/11</a:t>
             </a:fld>
             <a:endParaRPr lang="zh-TW" altLang="en-US"/>
           </a:p>
@@ -1141,7 +1150,7 @@
           <a:p>
             <a:fld id="{F08863E2-33C6-4A67-A414-40E7C2332897}" type="datetimeFigureOut">
               <a:rPr lang="zh-TW" altLang="en-US" smtClean="0"/>
-              <a:t>2022/11/29</a:t>
+              <a:t>2022/12/11</a:t>
             </a:fld>
             <a:endParaRPr lang="zh-TW" altLang="en-US"/>
           </a:p>
@@ -1406,7 +1415,7 @@
           <a:p>
             <a:fld id="{F08863E2-33C6-4A67-A414-40E7C2332897}" type="datetimeFigureOut">
               <a:rPr lang="zh-TW" altLang="en-US" smtClean="0"/>
-              <a:t>2022/11/29</a:t>
+              <a:t>2022/12/11</a:t>
             </a:fld>
             <a:endParaRPr lang="zh-TW" altLang="en-US"/>
           </a:p>
@@ -1818,7 +1827,7 @@
           <a:p>
             <a:fld id="{F08863E2-33C6-4A67-A414-40E7C2332897}" type="datetimeFigureOut">
               <a:rPr lang="zh-TW" altLang="en-US" smtClean="0"/>
-              <a:t>2022/11/29</a:t>
+              <a:t>2022/12/11</a:t>
             </a:fld>
             <a:endParaRPr lang="zh-TW" altLang="en-US"/>
           </a:p>
@@ -1959,7 +1968,7 @@
           <a:p>
             <a:fld id="{F08863E2-33C6-4A67-A414-40E7C2332897}" type="datetimeFigureOut">
               <a:rPr lang="zh-TW" altLang="en-US" smtClean="0"/>
-              <a:t>2022/11/29</a:t>
+              <a:t>2022/12/11</a:t>
             </a:fld>
             <a:endParaRPr lang="zh-TW" altLang="en-US"/>
           </a:p>
@@ -2072,7 +2081,7 @@
           <a:p>
             <a:fld id="{F08863E2-33C6-4A67-A414-40E7C2332897}" type="datetimeFigureOut">
               <a:rPr lang="zh-TW" altLang="en-US" smtClean="0"/>
-              <a:t>2022/11/29</a:t>
+              <a:t>2022/12/11</a:t>
             </a:fld>
             <a:endParaRPr lang="zh-TW" altLang="en-US"/>
           </a:p>
@@ -2383,7 +2392,7 @@
           <a:p>
             <a:fld id="{F08863E2-33C6-4A67-A414-40E7C2332897}" type="datetimeFigureOut">
               <a:rPr lang="zh-TW" altLang="en-US" smtClean="0"/>
-              <a:t>2022/11/29</a:t>
+              <a:t>2022/12/11</a:t>
             </a:fld>
             <a:endParaRPr lang="zh-TW" altLang="en-US"/>
           </a:p>
@@ -2671,7 +2680,7 @@
           <a:p>
             <a:fld id="{F08863E2-33C6-4A67-A414-40E7C2332897}" type="datetimeFigureOut">
               <a:rPr lang="zh-TW" altLang="en-US" smtClean="0"/>
-              <a:t>2022/11/29</a:t>
+              <a:t>2022/12/11</a:t>
             </a:fld>
             <a:endParaRPr lang="zh-TW" altLang="en-US"/>
           </a:p>
@@ -2912,7 +2921,7 @@
           <a:p>
             <a:fld id="{F08863E2-33C6-4A67-A414-40E7C2332897}" type="datetimeFigureOut">
               <a:rPr lang="zh-TW" altLang="en-US" smtClean="0"/>
-              <a:t>2022/11/29</a:t>
+              <a:t>2022/12/11</a:t>
             </a:fld>
             <a:endParaRPr lang="zh-TW" altLang="en-US"/>
           </a:p>
@@ -3398,6 +3407,697 @@
 </p:sld>
 </file>
 
+<file path=ppt/slides/slide10.xml><?xml version="1.0" encoding="utf-8"?>
+<p:sld xmlns:a="http://schemas.openxmlformats.org/drawingml/2006/main" xmlns:r="http://schemas.openxmlformats.org/officeDocument/2006/relationships" xmlns:p="http://schemas.openxmlformats.org/presentationml/2006/main">
+  <p:cSld>
+    <p:spTree>
+      <p:nvGrpSpPr>
+        <p:cNvPr id="1" name=""/>
+        <p:cNvGrpSpPr/>
+        <p:nvPr/>
+      </p:nvGrpSpPr>
+      <p:grpSpPr>
+        <a:xfrm>
+          <a:off x="0" y="0"/>
+          <a:ext cx="0" cy="0"/>
+          <a:chOff x="0" y="0"/>
+          <a:chExt cx="0" cy="0"/>
+        </a:xfrm>
+      </p:grpSpPr>
+      <p:sp>
+        <p:nvSpPr>
+          <p:cNvPr id="3" name="內容版面配置區 2">
+            <a:extLst>
+              <a:ext uri="{FF2B5EF4-FFF2-40B4-BE49-F238E27FC236}">
+                <a16:creationId xmlns:a16="http://schemas.microsoft.com/office/drawing/2014/main" id="{94882C2A-DCA0-4EA1-B023-B9DB578F9E06}"/>
+              </a:ext>
+            </a:extLst>
+          </p:cNvPr>
+          <p:cNvSpPr>
+            <a:spLocks noGrp="1"/>
+          </p:cNvSpPr>
+          <p:nvPr>
+            <p:ph idx="1"/>
+          </p:nvPr>
+        </p:nvSpPr>
+        <p:spPr/>
+        <p:txBody>
+          <a:bodyPr/>
+          <a:lstStyle/>
+          <a:p>
+            <a:r>
+              <a:rPr lang="zh-TW" altLang="en-US" dirty="0"/>
+              <a:t>憑倉買進價格是動態調整</a:t>
+            </a:r>
+            <a:r>
+              <a:rPr lang="en-US" altLang="zh-TW" dirty="0"/>
+              <a:t>, </a:t>
+            </a:r>
+            <a:r>
+              <a:rPr lang="zh-TW" altLang="en-US" dirty="0"/>
+              <a:t>會一直掛在最佳買價第三檔</a:t>
+            </a:r>
+            <a:endParaRPr lang="en-US" altLang="zh-TW" dirty="0"/>
+          </a:p>
+          <a:p>
+            <a:r>
+              <a:rPr lang="zh-TW" altLang="en-US" dirty="0"/>
+              <a:t>例如現在最佳買價是</a:t>
+            </a:r>
+            <a:r>
+              <a:rPr lang="en-US" altLang="zh-TW" dirty="0"/>
+              <a:t>105</a:t>
+            </a:r>
+            <a:r>
+              <a:rPr lang="zh-TW" altLang="en-US" dirty="0"/>
+              <a:t>（還沒掛單），就掛在</a:t>
+            </a:r>
+            <a:r>
+              <a:rPr lang="en-US" altLang="zh-TW" dirty="0"/>
+              <a:t>107</a:t>
+            </a:r>
+          </a:p>
+          <a:p>
+            <a:r>
+              <a:rPr lang="zh-TW" altLang="en-US" dirty="0"/>
+              <a:t>再次偵測後最佳買如果還是</a:t>
+            </a:r>
+            <a:r>
+              <a:rPr lang="en-US" altLang="zh-TW" dirty="0"/>
+              <a:t>107</a:t>
+            </a:r>
+            <a:r>
+              <a:rPr lang="zh-TW" altLang="en-US" dirty="0"/>
+              <a:t>就不往上移，如果別人掛了</a:t>
+            </a:r>
+            <a:r>
+              <a:rPr lang="en-US" altLang="zh-TW" dirty="0"/>
+              <a:t>107</a:t>
+            </a:r>
+            <a:r>
+              <a:rPr lang="zh-TW" altLang="en-US" dirty="0"/>
+              <a:t>，就改成</a:t>
+            </a:r>
+            <a:r>
+              <a:rPr lang="en-US" altLang="zh-TW" dirty="0"/>
+              <a:t>109</a:t>
+            </a:r>
+          </a:p>
+        </p:txBody>
+      </p:sp>
+      <p:sp>
+        <p:nvSpPr>
+          <p:cNvPr id="4" name="標題 1">
+            <a:extLst>
+              <a:ext uri="{FF2B5EF4-FFF2-40B4-BE49-F238E27FC236}">
+                <a16:creationId xmlns:a16="http://schemas.microsoft.com/office/drawing/2014/main" id="{ED242211-A1CD-4589-8C4F-EC7BA8943355}"/>
+              </a:ext>
+            </a:extLst>
+          </p:cNvPr>
+          <p:cNvSpPr txBox="1">
+            <a:spLocks/>
+          </p:cNvSpPr>
+          <p:nvPr/>
+        </p:nvSpPr>
+        <p:spPr>
+          <a:xfrm>
+            <a:off x="0" y="12790"/>
+            <a:ext cx="10515600" cy="1325563"/>
+          </a:xfrm>
+          <a:prstGeom prst="rect">
+            <a:avLst/>
+          </a:prstGeom>
+        </p:spPr>
+        <p:txBody>
+          <a:bodyPr vert="horz" lIns="91440" tIns="45720" rIns="91440" bIns="45720" rtlCol="0" anchor="ctr">
+            <a:normAutofit/>
+          </a:bodyPr>
+          <a:lstStyle>
+            <a:lvl1pPr algn="l" defTabSz="914400" rtl="0" eaLnBrk="1" latinLnBrk="0" hangingPunct="1">
+              <a:lnSpc>
+                <a:spcPct val="90000"/>
+              </a:lnSpc>
+              <a:spcBef>
+                <a:spcPct val="0"/>
+              </a:spcBef>
+              <a:buNone/>
+              <a:defRPr sz="4400" kern="1200">
+                <a:solidFill>
+                  <a:schemeClr val="tx1"/>
+                </a:solidFill>
+                <a:latin typeface="+mj-lt"/>
+                <a:ea typeface="+mj-ea"/>
+                <a:cs typeface="+mj-cs"/>
+              </a:defRPr>
+            </a:lvl1pPr>
+          </a:lstStyle>
+          <a:p>
+            <a:r>
+              <a:rPr lang="zh-TW" altLang="en-US" dirty="0"/>
+              <a:t>實單平倉</a:t>
+            </a:r>
+            <a:endParaRPr lang="en-US" altLang="zh-TW" dirty="0"/>
+          </a:p>
+          <a:p>
+            <a:r>
+              <a:rPr lang="zh-TW" altLang="en-US" sz="2800" dirty="0"/>
+              <a:t>功能二</a:t>
+            </a:r>
+          </a:p>
+        </p:txBody>
+      </p:sp>
+    </p:spTree>
+    <p:extLst>
+      <p:ext uri="{BB962C8B-B14F-4D97-AF65-F5344CB8AC3E}">
+        <p14:creationId xmlns:p14="http://schemas.microsoft.com/office/powerpoint/2010/main" val="1646012624"/>
+      </p:ext>
+    </p:extLst>
+  </p:cSld>
+  <p:clrMapOvr>
+    <a:masterClrMapping/>
+  </p:clrMapOvr>
+</p:sld>
+</file>
+
+<file path=ppt/slides/slide11.xml><?xml version="1.0" encoding="utf-8"?>
+<p:sld xmlns:a="http://schemas.openxmlformats.org/drawingml/2006/main" xmlns:r="http://schemas.openxmlformats.org/officeDocument/2006/relationships" xmlns:p="http://schemas.openxmlformats.org/presentationml/2006/main">
+  <p:cSld>
+    <p:spTree>
+      <p:nvGrpSpPr>
+        <p:cNvPr id="1" name=""/>
+        <p:cNvGrpSpPr/>
+        <p:nvPr/>
+      </p:nvGrpSpPr>
+      <p:grpSpPr>
+        <a:xfrm>
+          <a:off x="0" y="0"/>
+          <a:ext cx="0" cy="0"/>
+          <a:chOff x="0" y="0"/>
+          <a:chExt cx="0" cy="0"/>
+        </a:xfrm>
+      </p:grpSpPr>
+      <p:sp>
+        <p:nvSpPr>
+          <p:cNvPr id="2" name="標題 1">
+            <a:extLst>
+              <a:ext uri="{FF2B5EF4-FFF2-40B4-BE49-F238E27FC236}">
+                <a16:creationId xmlns:a16="http://schemas.microsoft.com/office/drawing/2014/main" id="{D30B6F10-B981-4C5C-A863-123C980CB0C7}"/>
+              </a:ext>
+            </a:extLst>
+          </p:cNvPr>
+          <p:cNvSpPr>
+            <a:spLocks noGrp="1"/>
+          </p:cNvSpPr>
+          <p:nvPr>
+            <p:ph type="title"/>
+          </p:nvPr>
+        </p:nvSpPr>
+        <p:spPr/>
+        <p:txBody>
+          <a:bodyPr>
+            <a:normAutofit/>
+          </a:bodyPr>
+          <a:lstStyle/>
+          <a:p>
+            <a:r>
+              <a:rPr lang="zh-TW" altLang="en-US" dirty="0"/>
+              <a:t>實單成功畫面</a:t>
+            </a:r>
+            <a:br>
+              <a:rPr lang="zh-TW" altLang="en-US" dirty="0"/>
+            </a:br>
+            <a:endParaRPr lang="zh-TW" altLang="en-US" dirty="0"/>
+          </a:p>
+        </p:txBody>
+      </p:sp>
+      <p:sp>
+        <p:nvSpPr>
+          <p:cNvPr id="3" name="內容版面配置區 2">
+            <a:extLst>
+              <a:ext uri="{FF2B5EF4-FFF2-40B4-BE49-F238E27FC236}">
+                <a16:creationId xmlns:a16="http://schemas.microsoft.com/office/drawing/2014/main" id="{C5F39A6F-8DB5-4E3C-9C2E-8F1526792048}"/>
+              </a:ext>
+            </a:extLst>
+          </p:cNvPr>
+          <p:cNvSpPr>
+            <a:spLocks noGrp="1"/>
+          </p:cNvSpPr>
+          <p:nvPr>
+            <p:ph idx="1"/>
+          </p:nvPr>
+        </p:nvSpPr>
+        <p:spPr/>
+        <p:txBody>
+          <a:bodyPr/>
+          <a:lstStyle/>
+          <a:p>
+            <a:r>
+              <a:rPr lang="zh-TW" altLang="en-US" dirty="0"/>
+              <a:t>左邊</a:t>
+            </a:r>
+            <a:r>
+              <a:rPr lang="en-US" altLang="zh-TW" dirty="0"/>
+              <a:t>log </a:t>
+            </a:r>
+            <a:r>
+              <a:rPr lang="zh-TW" altLang="en-US" dirty="0"/>
+              <a:t>右邊為永豐</a:t>
+            </a:r>
+            <a:r>
+              <a:rPr lang="en-US" altLang="zh-TW" dirty="0"/>
+              <a:t>APP</a:t>
+            </a:r>
+            <a:r>
+              <a:rPr lang="zh-TW" altLang="en-US" dirty="0"/>
+              <a:t>交易紀錄</a:t>
+            </a:r>
+          </a:p>
+        </p:txBody>
+      </p:sp>
+      <p:pic>
+        <p:nvPicPr>
+          <p:cNvPr id="4" name="Picture 4" descr="未提供說明。">
+            <a:extLst>
+              <a:ext uri="{FF2B5EF4-FFF2-40B4-BE49-F238E27FC236}">
+                <a16:creationId xmlns:a16="http://schemas.microsoft.com/office/drawing/2014/main" id="{8D9EDF74-E96D-435D-81FD-40CE90010759}"/>
+              </a:ext>
+            </a:extLst>
+          </p:cNvPr>
+          <p:cNvPicPr>
+            <a:picLocks noChangeAspect="1" noChangeArrowheads="1"/>
+          </p:cNvPicPr>
+          <p:nvPr/>
+        </p:nvPicPr>
+        <p:blipFill>
+          <a:blip r:embed="rId2">
+            <a:extLst>
+              <a:ext uri="{28A0092B-C50C-407E-A947-70E740481C1C}">
+                <a14:useLocalDpi xmlns:a14="http://schemas.microsoft.com/office/drawing/2010/main" val="0"/>
+              </a:ext>
+            </a:extLst>
+          </a:blip>
+          <a:srcRect/>
+          <a:stretch>
+            <a:fillRect/>
+          </a:stretch>
+        </p:blipFill>
+        <p:spPr bwMode="auto">
+          <a:xfrm>
+            <a:off x="9023350" y="0"/>
+            <a:ext cx="3168650" cy="6858000"/>
+          </a:xfrm>
+          <a:prstGeom prst="rect">
+            <a:avLst/>
+          </a:prstGeom>
+          <a:noFill/>
+          <a:extLst>
+            <a:ext uri="{909E8E84-426E-40DD-AFC4-6F175D3DCCD1}">
+              <a14:hiddenFill xmlns:a14="http://schemas.microsoft.com/office/drawing/2010/main">
+                <a:solidFill>
+                  <a:srgbClr val="FFFFFF"/>
+                </a:solidFill>
+              </a14:hiddenFill>
+            </a:ext>
+          </a:extLst>
+        </p:spPr>
+      </p:pic>
+      <p:pic>
+        <p:nvPicPr>
+          <p:cNvPr id="5" name="圖片 4">
+            <a:extLst>
+              <a:ext uri="{FF2B5EF4-FFF2-40B4-BE49-F238E27FC236}">
+                <a16:creationId xmlns:a16="http://schemas.microsoft.com/office/drawing/2014/main" id="{E9FD5571-5B8C-4C24-880D-24E038834AE5}"/>
+              </a:ext>
+            </a:extLst>
+          </p:cNvPr>
+          <p:cNvPicPr>
+            <a:picLocks noChangeAspect="1"/>
+          </p:cNvPicPr>
+          <p:nvPr/>
+        </p:nvPicPr>
+        <p:blipFill>
+          <a:blip r:embed="rId3"/>
+          <a:stretch>
+            <a:fillRect/>
+          </a:stretch>
+        </p:blipFill>
+        <p:spPr>
+          <a:xfrm>
+            <a:off x="0" y="4424337"/>
+            <a:ext cx="8833607" cy="2433663"/>
+          </a:xfrm>
+          <a:prstGeom prst="rect">
+            <a:avLst/>
+          </a:prstGeom>
+        </p:spPr>
+      </p:pic>
+    </p:spTree>
+    <p:extLst>
+      <p:ext uri="{BB962C8B-B14F-4D97-AF65-F5344CB8AC3E}">
+        <p14:creationId xmlns:p14="http://schemas.microsoft.com/office/powerpoint/2010/main" val="1761326388"/>
+      </p:ext>
+    </p:extLst>
+  </p:cSld>
+  <p:clrMapOvr>
+    <a:masterClrMapping/>
+  </p:clrMapOvr>
+</p:sld>
+</file>
+
+<file path=ppt/slides/slide12.xml><?xml version="1.0" encoding="utf-8"?>
+<p:sld xmlns:a="http://schemas.openxmlformats.org/drawingml/2006/main" xmlns:r="http://schemas.openxmlformats.org/officeDocument/2006/relationships" xmlns:p="http://schemas.openxmlformats.org/presentationml/2006/main">
+  <p:cSld>
+    <p:spTree>
+      <p:nvGrpSpPr>
+        <p:cNvPr id="1" name=""/>
+        <p:cNvGrpSpPr/>
+        <p:nvPr/>
+      </p:nvGrpSpPr>
+      <p:grpSpPr>
+        <a:xfrm>
+          <a:off x="0" y="0"/>
+          <a:ext cx="0" cy="0"/>
+          <a:chOff x="0" y="0"/>
+          <a:chExt cx="0" cy="0"/>
+        </a:xfrm>
+      </p:grpSpPr>
+      <p:sp>
+        <p:nvSpPr>
+          <p:cNvPr id="2" name="標題 1">
+            <a:extLst>
+              <a:ext uri="{FF2B5EF4-FFF2-40B4-BE49-F238E27FC236}">
+                <a16:creationId xmlns:a16="http://schemas.microsoft.com/office/drawing/2014/main" id="{7900AE8C-B885-412B-A332-1D7059AEE3A8}"/>
+              </a:ext>
+            </a:extLst>
+          </p:cNvPr>
+          <p:cNvSpPr>
+            <a:spLocks noGrp="1"/>
+          </p:cNvSpPr>
+          <p:nvPr>
+            <p:ph type="title"/>
+          </p:nvPr>
+        </p:nvSpPr>
+        <p:spPr>
+          <a:xfrm>
+            <a:off x="0" y="18255"/>
+            <a:ext cx="10515600" cy="1325563"/>
+          </a:xfrm>
+        </p:spPr>
+        <p:txBody>
+          <a:bodyPr/>
+          <a:lstStyle/>
+          <a:p>
+            <a:r>
+              <a:rPr lang="zh-TW" altLang="en-US" dirty="0"/>
+              <a:t>其他說明</a:t>
+            </a:r>
+          </a:p>
+        </p:txBody>
+      </p:sp>
+      <p:sp>
+        <p:nvSpPr>
+          <p:cNvPr id="3" name="內容版面配置區 2">
+            <a:extLst>
+              <a:ext uri="{FF2B5EF4-FFF2-40B4-BE49-F238E27FC236}">
+                <a16:creationId xmlns:a16="http://schemas.microsoft.com/office/drawing/2014/main" id="{134EB4F7-8BDB-4988-9BCB-C3CFA66D6228}"/>
+              </a:ext>
+            </a:extLst>
+          </p:cNvPr>
+          <p:cNvSpPr>
+            <a:spLocks noGrp="1"/>
+          </p:cNvSpPr>
+          <p:nvPr>
+            <p:ph idx="1"/>
+          </p:nvPr>
+        </p:nvSpPr>
+        <p:spPr/>
+        <p:txBody>
+          <a:bodyPr/>
+          <a:lstStyle/>
+          <a:p>
+            <a:r>
+              <a:rPr lang="zh-TW" altLang="en-US" dirty="0"/>
+              <a:t>不論實單或模擬單 皆沒有考慮禮拜三下單狀況</a:t>
+            </a:r>
+            <a:r>
+              <a:rPr lang="en-US" altLang="zh-TW" dirty="0"/>
+              <a:t>(</a:t>
+            </a:r>
+            <a:r>
+              <a:rPr lang="zh-TW" altLang="en-US" dirty="0"/>
+              <a:t>避免結算日</a:t>
+            </a:r>
+            <a:r>
+              <a:rPr lang="en-US" altLang="zh-TW" dirty="0"/>
+              <a:t>)</a:t>
+            </a:r>
+          </a:p>
+          <a:p>
+            <a:r>
+              <a:rPr lang="en-US" altLang="zh-TW" dirty="0" err="1"/>
+              <a:t>config.json</a:t>
+            </a:r>
+            <a:r>
+              <a:rPr lang="zh-TW" altLang="en-US" dirty="0"/>
+              <a:t>裡有以下控制參數</a:t>
+            </a:r>
+            <a:endParaRPr lang="en-US" altLang="zh-TW" dirty="0"/>
+          </a:p>
+          <a:p>
+            <a:pPr lvl="1"/>
+            <a:r>
+              <a:rPr lang="en-US" altLang="zh-TW" dirty="0" err="1"/>
+              <a:t>simulation_mode</a:t>
+            </a:r>
+            <a:r>
+              <a:rPr lang="en-US" altLang="zh-TW" dirty="0"/>
+              <a:t>:</a:t>
+            </a:r>
+            <a:r>
+              <a:rPr lang="zh-TW" altLang="en-US" dirty="0"/>
+              <a:t> 控制模擬單是否下單以及平倉</a:t>
+            </a:r>
+            <a:endParaRPr lang="en-US" altLang="zh-TW" dirty="0"/>
+          </a:p>
+          <a:p>
+            <a:pPr lvl="1"/>
+            <a:r>
+              <a:rPr lang="en-US" altLang="zh-TW" dirty="0" err="1"/>
+              <a:t>cover_mode</a:t>
+            </a:r>
+            <a:r>
+              <a:rPr lang="en-US" altLang="zh-TW" dirty="0"/>
+              <a:t>:</a:t>
+            </a:r>
+            <a:r>
+              <a:rPr lang="zh-TW" altLang="en-US" dirty="0"/>
+              <a:t> 控制實單是否要平倉</a:t>
+            </a:r>
+            <a:endParaRPr lang="en-US" altLang="zh-TW" dirty="0"/>
+          </a:p>
+          <a:p>
+            <a:pPr lvl="1"/>
+            <a:r>
+              <a:rPr lang="zh-TW" altLang="en-US" dirty="0"/>
+              <a:t>只能有一方是</a:t>
+            </a:r>
+            <a:r>
+              <a:rPr lang="en-US" altLang="zh-TW" dirty="0"/>
+              <a:t>true, </a:t>
+            </a:r>
+            <a:r>
+              <a:rPr lang="zh-TW" altLang="en-US" dirty="0"/>
+              <a:t>原因是避免模擬與實單訊息參雜</a:t>
+            </a:r>
+            <a:r>
+              <a:rPr lang="en-US" altLang="zh-TW" dirty="0"/>
+              <a:t>, </a:t>
+            </a:r>
+            <a:r>
+              <a:rPr lang="zh-TW" altLang="en-US" dirty="0"/>
+              <a:t>過於混亂</a:t>
+            </a:r>
+            <a:endParaRPr lang="en-US" altLang="zh-TW" dirty="0"/>
+          </a:p>
+          <a:p>
+            <a:r>
+              <a:rPr lang="zh-TW" altLang="en-US" dirty="0"/>
+              <a:t>這支程式只能平倉舊單 也就是如果在禮拜三當天下新單 這支程式不能處理 只能處理上禮拜四到這禮拜三的舊單</a:t>
+            </a:r>
+          </a:p>
+          <a:p>
+            <a:endParaRPr lang="zh-TW" altLang="en-US" dirty="0"/>
+          </a:p>
+          <a:p>
+            <a:endParaRPr lang="zh-TW" altLang="en-US" dirty="0"/>
+          </a:p>
+        </p:txBody>
+      </p:sp>
+    </p:spTree>
+    <p:extLst>
+      <p:ext uri="{BB962C8B-B14F-4D97-AF65-F5344CB8AC3E}">
+        <p14:creationId xmlns:p14="http://schemas.microsoft.com/office/powerpoint/2010/main" val="1972488609"/>
+      </p:ext>
+    </p:extLst>
+  </p:cSld>
+  <p:clrMapOvr>
+    <a:masterClrMapping/>
+  </p:clrMapOvr>
+</p:sld>
+</file>
+
+<file path=ppt/slides/slide13.xml><?xml version="1.0" encoding="utf-8"?>
+<p:sld xmlns:a="http://schemas.openxmlformats.org/drawingml/2006/main" xmlns:r="http://schemas.openxmlformats.org/officeDocument/2006/relationships" xmlns:p="http://schemas.openxmlformats.org/presentationml/2006/main">
+  <p:cSld>
+    <p:spTree>
+      <p:nvGrpSpPr>
+        <p:cNvPr id="1" name=""/>
+        <p:cNvGrpSpPr/>
+        <p:nvPr/>
+      </p:nvGrpSpPr>
+      <p:grpSpPr>
+        <a:xfrm>
+          <a:off x="0" y="0"/>
+          <a:ext cx="0" cy="0"/>
+          <a:chOff x="0" y="0"/>
+          <a:chExt cx="0" cy="0"/>
+        </a:xfrm>
+      </p:grpSpPr>
+      <p:sp>
+        <p:nvSpPr>
+          <p:cNvPr id="2" name="標題 1">
+            <a:extLst>
+              <a:ext uri="{FF2B5EF4-FFF2-40B4-BE49-F238E27FC236}">
+                <a16:creationId xmlns:a16="http://schemas.microsoft.com/office/drawing/2014/main" id="{E304F942-1E32-457C-A5F4-C4BC20D95FF8}"/>
+              </a:ext>
+            </a:extLst>
+          </p:cNvPr>
+          <p:cNvSpPr>
+            <a:spLocks noGrp="1"/>
+          </p:cNvSpPr>
+          <p:nvPr>
+            <p:ph type="title"/>
+          </p:nvPr>
+        </p:nvSpPr>
+        <p:spPr>
+          <a:xfrm>
+            <a:off x="0" y="18255"/>
+            <a:ext cx="10515600" cy="1325563"/>
+          </a:xfrm>
+        </p:spPr>
+        <p:txBody>
+          <a:bodyPr/>
+          <a:lstStyle/>
+          <a:p>
+            <a:r>
+              <a:rPr lang="zh-TW" altLang="en-US" dirty="0"/>
+              <a:t>其他說明</a:t>
+            </a:r>
+          </a:p>
+        </p:txBody>
+      </p:sp>
+      <p:sp>
+        <p:nvSpPr>
+          <p:cNvPr id="3" name="內容版面配置區 2">
+            <a:extLst>
+              <a:ext uri="{FF2B5EF4-FFF2-40B4-BE49-F238E27FC236}">
+                <a16:creationId xmlns:a16="http://schemas.microsoft.com/office/drawing/2014/main" id="{4C62962E-B7DF-476C-AA0B-9AC506DC204C}"/>
+              </a:ext>
+            </a:extLst>
+          </p:cNvPr>
+          <p:cNvSpPr>
+            <a:spLocks noGrp="1"/>
+          </p:cNvSpPr>
+          <p:nvPr>
+            <p:ph idx="1"/>
+          </p:nvPr>
+        </p:nvSpPr>
+        <p:spPr/>
+        <p:txBody>
+          <a:bodyPr/>
+          <a:lstStyle/>
+          <a:p>
+            <a:r>
+              <a:rPr lang="zh-TW" altLang="en-US" dirty="0"/>
+              <a:t>程式執行時需初始化一小段時間 請稍等</a:t>
+            </a:r>
+            <a:endParaRPr lang="en-US" altLang="zh-TW" dirty="0"/>
+          </a:p>
+          <a:p>
+            <a:r>
+              <a:rPr lang="zh-TW" altLang="en-US" dirty="0"/>
+              <a:t>若看到執行到</a:t>
+            </a:r>
+            <a:r>
+              <a:rPr lang="en-US" altLang="zh-TW" dirty="0"/>
+              <a:t>Response Code: 200</a:t>
+            </a:r>
+            <a:r>
+              <a:rPr lang="zh-TW" altLang="en-US" dirty="0"/>
+              <a:t> 即代表程式可以開始動作</a:t>
+            </a:r>
+            <a:endParaRPr lang="en-US" altLang="zh-TW" dirty="0"/>
+          </a:p>
+          <a:p>
+            <a:pPr lvl="1"/>
+            <a:r>
+              <a:rPr lang="zh-TW" altLang="en-US" dirty="0"/>
+              <a:t>此時可以開始修改</a:t>
+            </a:r>
+            <a:r>
+              <a:rPr lang="en-US" altLang="zh-TW" dirty="0"/>
+              <a:t>JSON</a:t>
+            </a:r>
+            <a:r>
+              <a:rPr lang="zh-TW" altLang="en-US" dirty="0"/>
+              <a:t>內容</a:t>
+            </a:r>
+          </a:p>
+        </p:txBody>
+      </p:sp>
+      <p:pic>
+        <p:nvPicPr>
+          <p:cNvPr id="4" name="圖片 3">
+            <a:extLst>
+              <a:ext uri="{FF2B5EF4-FFF2-40B4-BE49-F238E27FC236}">
+                <a16:creationId xmlns:a16="http://schemas.microsoft.com/office/drawing/2014/main" id="{8180A724-96B5-483C-A78A-B80AC2E8ED51}"/>
+              </a:ext>
+            </a:extLst>
+          </p:cNvPr>
+          <p:cNvPicPr>
+            <a:picLocks noChangeAspect="1"/>
+          </p:cNvPicPr>
+          <p:nvPr/>
+        </p:nvPicPr>
+        <p:blipFill>
+          <a:blip r:embed="rId2"/>
+          <a:stretch>
+            <a:fillRect/>
+          </a:stretch>
+        </p:blipFill>
+        <p:spPr>
+          <a:xfrm>
+            <a:off x="3600450" y="3725070"/>
+            <a:ext cx="8591550" cy="3114675"/>
+          </a:xfrm>
+          <a:prstGeom prst="rect">
+            <a:avLst/>
+          </a:prstGeom>
+        </p:spPr>
+      </p:pic>
+    </p:spTree>
+    <p:extLst>
+      <p:ext uri="{BB962C8B-B14F-4D97-AF65-F5344CB8AC3E}">
+        <p14:creationId xmlns:p14="http://schemas.microsoft.com/office/powerpoint/2010/main" val="2071555814"/>
+      </p:ext>
+    </p:extLst>
+  </p:cSld>
+  <p:clrMapOvr>
+    <a:masterClrMapping/>
+  </p:clrMapOvr>
+</p:sld>
+</file>
+
 <file path=ppt/slides/slide2.xml><?xml version="1.0" encoding="utf-8"?>
 <p:sld xmlns:a="http://schemas.openxmlformats.org/drawingml/2006/main" xmlns:r="http://schemas.openxmlformats.org/officeDocument/2006/relationships" xmlns:p="http://schemas.openxmlformats.org/presentationml/2006/main">
   <p:cSld>
@@ -3685,6 +4385,24 @@
           <a:p>
             <a:r>
               <a:rPr lang="zh-TW" altLang="en-US" dirty="0"/>
+              <a:t>在</a:t>
+            </a:r>
+            <a:r>
+              <a:rPr lang="en-US" altLang="zh-TW" dirty="0"/>
+              <a:t>main function </a:t>
+            </a:r>
+            <a:r>
+              <a:rPr lang="zh-TW" altLang="en-US" dirty="0"/>
+              <a:t>統一控制</a:t>
+            </a:r>
+            <a:r>
+              <a:rPr lang="en-US" altLang="zh-TW" dirty="0"/>
+              <a:t>thread</a:t>
+            </a:r>
+          </a:p>
+          <a:p>
+            <a:r>
+              <a:rPr lang="zh-TW" altLang="en-US" dirty="0"/>
               <a:t>由</a:t>
             </a:r>
             <a:r>
@@ -3706,66 +4424,6 @@
           </a:p>
         </p:txBody>
       </p:sp>
-      <p:pic>
-        <p:nvPicPr>
-          <p:cNvPr id="4" name="圖片 3">
-            <a:extLst>
-              <a:ext uri="{FF2B5EF4-FFF2-40B4-BE49-F238E27FC236}">
-                <a16:creationId xmlns:a16="http://schemas.microsoft.com/office/drawing/2014/main" id="{B6C9AA65-2BB0-429F-9533-4B4C3191690D}"/>
-              </a:ext>
-            </a:extLst>
-          </p:cNvPr>
-          <p:cNvPicPr>
-            <a:picLocks noChangeAspect="1"/>
-          </p:cNvPicPr>
-          <p:nvPr/>
-        </p:nvPicPr>
-        <p:blipFill>
-          <a:blip r:embed="rId2"/>
-          <a:stretch>
-            <a:fillRect/>
-          </a:stretch>
-        </p:blipFill>
-        <p:spPr>
-          <a:xfrm>
-            <a:off x="9672507" y="-1"/>
-            <a:ext cx="2519494" cy="4161755"/>
-          </a:xfrm>
-          <a:prstGeom prst="rect">
-            <a:avLst/>
-          </a:prstGeom>
-        </p:spPr>
-      </p:pic>
-      <p:pic>
-        <p:nvPicPr>
-          <p:cNvPr id="5" name="圖片 4">
-            <a:extLst>
-              <a:ext uri="{FF2B5EF4-FFF2-40B4-BE49-F238E27FC236}">
-                <a16:creationId xmlns:a16="http://schemas.microsoft.com/office/drawing/2014/main" id="{C3EBF5B3-99D8-4559-BFAE-DBDDCFCEBD36}"/>
-              </a:ext>
-            </a:extLst>
-          </p:cNvPr>
-          <p:cNvPicPr>
-            <a:picLocks noChangeAspect="1"/>
-          </p:cNvPicPr>
-          <p:nvPr/>
-        </p:nvPicPr>
-        <p:blipFill>
-          <a:blip r:embed="rId3"/>
-          <a:stretch>
-            <a:fillRect/>
-          </a:stretch>
-        </p:blipFill>
-        <p:spPr>
-          <a:xfrm>
-            <a:off x="946558" y="3510895"/>
-            <a:ext cx="4665677" cy="3353455"/>
-          </a:xfrm>
-          <a:prstGeom prst="rect">
-            <a:avLst/>
-          </a:prstGeom>
-        </p:spPr>
-      </p:pic>
       <p:cxnSp>
         <p:nvCxnSpPr>
           <p:cNvPr id="7" name="直線單箭頭接點 6">
@@ -3780,7 +4438,7 @@
         </p:nvCxnSpPr>
         <p:spPr>
           <a:xfrm flipH="1">
-            <a:off x="8523215" y="2365695"/>
+            <a:off x="8473582" y="2866937"/>
             <a:ext cx="1283515" cy="562063"/>
           </a:xfrm>
           <a:prstGeom prst="straightConnector1">
@@ -3819,7 +4477,7 @@
         </p:nvSpPr>
         <p:spPr>
           <a:xfrm>
-            <a:off x="6976145" y="2852257"/>
+            <a:off x="6937346" y="3429000"/>
             <a:ext cx="1572237" cy="369332"/>
           </a:xfrm>
           <a:prstGeom prst="rect">
@@ -3854,7 +4512,7 @@
         </p:nvCxnSpPr>
         <p:spPr>
           <a:xfrm flipH="1" flipV="1">
-            <a:off x="8883941" y="989901"/>
+            <a:off x="8894776" y="963306"/>
             <a:ext cx="922789" cy="251670"/>
           </a:xfrm>
           <a:prstGeom prst="straightConnector1">
@@ -3918,6 +4576,355 @@
             <a:r>
               <a:rPr lang="zh-TW" altLang="en-US" dirty="0"/>
               <a:t>登錄相關</a:t>
+            </a:r>
+          </a:p>
+        </p:txBody>
+      </p:sp>
+      <p:pic>
+        <p:nvPicPr>
+          <p:cNvPr id="11" name="圖片 10">
+            <a:extLst>
+              <a:ext uri="{FF2B5EF4-FFF2-40B4-BE49-F238E27FC236}">
+                <a16:creationId xmlns:a16="http://schemas.microsoft.com/office/drawing/2014/main" id="{455EFA3E-7719-44F9-B0BE-5082CC7AE0ED}"/>
+              </a:ext>
+            </a:extLst>
+          </p:cNvPr>
+          <p:cNvPicPr>
+            <a:picLocks noChangeAspect="1"/>
+          </p:cNvPicPr>
+          <p:nvPr/>
+        </p:nvPicPr>
+        <p:blipFill>
+          <a:blip r:embed="rId2"/>
+          <a:stretch>
+            <a:fillRect/>
+          </a:stretch>
+        </p:blipFill>
+        <p:spPr>
+          <a:xfrm>
+            <a:off x="9757097" y="0"/>
+            <a:ext cx="2409825" cy="5095875"/>
+          </a:xfrm>
+          <a:prstGeom prst="rect">
+            <a:avLst/>
+          </a:prstGeom>
+        </p:spPr>
+      </p:pic>
+      <p:cxnSp>
+        <p:nvCxnSpPr>
+          <p:cNvPr id="13" name="直線單箭頭接點 12">
+            <a:extLst>
+              <a:ext uri="{FF2B5EF4-FFF2-40B4-BE49-F238E27FC236}">
+                <a16:creationId xmlns:a16="http://schemas.microsoft.com/office/drawing/2014/main" id="{4815503A-8AD9-4B1E-9FD4-EE5E1F2AC50B}"/>
+              </a:ext>
+            </a:extLst>
+          </p:cNvPr>
+          <p:cNvCxnSpPr/>
+          <p:nvPr/>
+        </p:nvCxnSpPr>
+        <p:spPr>
+          <a:xfrm flipH="1">
+            <a:off x="8473581" y="2677011"/>
+            <a:ext cx="1283515" cy="562063"/>
+          </a:xfrm>
+          <a:prstGeom prst="straightConnector1">
+            <a:avLst/>
+          </a:prstGeom>
+          <a:ln>
+            <a:tailEnd type="triangle"/>
+          </a:ln>
+        </p:spPr>
+        <p:style>
+          <a:lnRef idx="1">
+            <a:schemeClr val="accent1"/>
+          </a:lnRef>
+          <a:fillRef idx="0">
+            <a:schemeClr val="accent1"/>
+          </a:fillRef>
+          <a:effectRef idx="0">
+            <a:schemeClr val="accent1"/>
+          </a:effectRef>
+          <a:fontRef idx="minor">
+            <a:schemeClr val="tx1"/>
+          </a:fontRef>
+        </p:style>
+      </p:cxnSp>
+      <p:sp>
+        <p:nvSpPr>
+          <p:cNvPr id="14" name="文字方塊 13">
+            <a:extLst>
+              <a:ext uri="{FF2B5EF4-FFF2-40B4-BE49-F238E27FC236}">
+                <a16:creationId xmlns:a16="http://schemas.microsoft.com/office/drawing/2014/main" id="{B26A1872-EAA4-4349-86C6-768E8863927A}"/>
+              </a:ext>
+            </a:extLst>
+          </p:cNvPr>
+          <p:cNvSpPr txBox="1"/>
+          <p:nvPr/>
+        </p:nvSpPr>
+        <p:spPr>
+          <a:xfrm>
+            <a:off x="6950629" y="3059668"/>
+            <a:ext cx="1572237" cy="369332"/>
+          </a:xfrm>
+          <a:prstGeom prst="rect">
+            <a:avLst/>
+          </a:prstGeom>
+          <a:noFill/>
+        </p:spPr>
+        <p:txBody>
+          <a:bodyPr wrap="square" rtlCol="0">
+            <a:spAutoFit/>
+          </a:bodyPr>
+          <a:lstStyle/>
+          <a:p>
+            <a:r>
+              <a:rPr lang="zh-TW" altLang="en-US" dirty="0"/>
+              <a:t>處理模擬下單</a:t>
+            </a:r>
+          </a:p>
+        </p:txBody>
+      </p:sp>
+      <p:cxnSp>
+        <p:nvCxnSpPr>
+          <p:cNvPr id="15" name="直線單箭頭接點 14">
+            <a:extLst>
+              <a:ext uri="{FF2B5EF4-FFF2-40B4-BE49-F238E27FC236}">
+                <a16:creationId xmlns:a16="http://schemas.microsoft.com/office/drawing/2014/main" id="{A2C8637C-5864-4927-9ACC-AD419BE8D53A}"/>
+              </a:ext>
+            </a:extLst>
+          </p:cNvPr>
+          <p:cNvCxnSpPr>
+            <a:cxnSpLocks/>
+            <a:endCxn id="16" idx="3"/>
+          </p:cNvCxnSpPr>
+          <p:nvPr/>
+        </p:nvCxnSpPr>
+        <p:spPr>
+          <a:xfrm flipH="1">
+            <a:off x="8510081" y="2435287"/>
+            <a:ext cx="1271660" cy="465697"/>
+          </a:xfrm>
+          <a:prstGeom prst="straightConnector1">
+            <a:avLst/>
+          </a:prstGeom>
+          <a:ln>
+            <a:tailEnd type="triangle"/>
+          </a:ln>
+        </p:spPr>
+        <p:style>
+          <a:lnRef idx="1">
+            <a:schemeClr val="accent1"/>
+          </a:lnRef>
+          <a:fillRef idx="0">
+            <a:schemeClr val="accent1"/>
+          </a:fillRef>
+          <a:effectRef idx="0">
+            <a:schemeClr val="accent1"/>
+          </a:effectRef>
+          <a:fontRef idx="minor">
+            <a:schemeClr val="tx1"/>
+          </a:fontRef>
+        </p:style>
+      </p:cxnSp>
+      <p:sp>
+        <p:nvSpPr>
+          <p:cNvPr id="16" name="文字方塊 15">
+            <a:extLst>
+              <a:ext uri="{FF2B5EF4-FFF2-40B4-BE49-F238E27FC236}">
+                <a16:creationId xmlns:a16="http://schemas.microsoft.com/office/drawing/2014/main" id="{1A37890D-2629-4E8D-A55F-FD66CA0C26EF}"/>
+              </a:ext>
+            </a:extLst>
+          </p:cNvPr>
+          <p:cNvSpPr txBox="1"/>
+          <p:nvPr/>
+        </p:nvSpPr>
+        <p:spPr>
+          <a:xfrm>
+            <a:off x="5981700" y="2716318"/>
+            <a:ext cx="2528381" cy="369332"/>
+          </a:xfrm>
+          <a:prstGeom prst="rect">
+            <a:avLst/>
+          </a:prstGeom>
+          <a:noFill/>
+        </p:spPr>
+        <p:txBody>
+          <a:bodyPr wrap="square" rtlCol="0">
+            <a:spAutoFit/>
+          </a:bodyPr>
+          <a:lstStyle/>
+          <a:p>
+            <a:r>
+              <a:rPr lang="zh-TW" altLang="en-US" dirty="0"/>
+              <a:t>處理模擬及實單之平倉</a:t>
+            </a:r>
+          </a:p>
+        </p:txBody>
+      </p:sp>
+      <p:cxnSp>
+        <p:nvCxnSpPr>
+          <p:cNvPr id="17" name="直線單箭頭接點 16">
+            <a:extLst>
+              <a:ext uri="{FF2B5EF4-FFF2-40B4-BE49-F238E27FC236}">
+                <a16:creationId xmlns:a16="http://schemas.microsoft.com/office/drawing/2014/main" id="{CD2945A8-382A-4329-BDB4-692BB5A4D833}"/>
+              </a:ext>
+            </a:extLst>
+          </p:cNvPr>
+          <p:cNvCxnSpPr/>
+          <p:nvPr/>
+        </p:nvCxnSpPr>
+        <p:spPr>
+          <a:xfrm flipH="1">
+            <a:off x="8563065" y="3288447"/>
+            <a:ext cx="1283515" cy="562063"/>
+          </a:xfrm>
+          <a:prstGeom prst="straightConnector1">
+            <a:avLst/>
+          </a:prstGeom>
+          <a:ln>
+            <a:tailEnd type="triangle"/>
+          </a:ln>
+        </p:spPr>
+        <p:style>
+          <a:lnRef idx="1">
+            <a:schemeClr val="accent1"/>
+          </a:lnRef>
+          <a:fillRef idx="0">
+            <a:schemeClr val="accent1"/>
+          </a:fillRef>
+          <a:effectRef idx="0">
+            <a:schemeClr val="accent1"/>
+          </a:effectRef>
+          <a:fontRef idx="minor">
+            <a:schemeClr val="tx1"/>
+          </a:fontRef>
+        </p:style>
+      </p:cxnSp>
+      <p:cxnSp>
+        <p:nvCxnSpPr>
+          <p:cNvPr id="18" name="直線單箭頭接點 17">
+            <a:extLst>
+              <a:ext uri="{FF2B5EF4-FFF2-40B4-BE49-F238E27FC236}">
+                <a16:creationId xmlns:a16="http://schemas.microsoft.com/office/drawing/2014/main" id="{F01CCBA0-5326-4BCC-AEB5-4EEC79451916}"/>
+              </a:ext>
+            </a:extLst>
+          </p:cNvPr>
+          <p:cNvCxnSpPr>
+            <a:cxnSpLocks/>
+            <a:endCxn id="20" idx="3"/>
+          </p:cNvCxnSpPr>
+          <p:nvPr/>
+        </p:nvCxnSpPr>
+        <p:spPr>
+          <a:xfrm flipH="1">
+            <a:off x="8565746" y="3541097"/>
+            <a:ext cx="1267552" cy="746701"/>
+          </a:xfrm>
+          <a:prstGeom prst="straightConnector1">
+            <a:avLst/>
+          </a:prstGeom>
+          <a:ln>
+            <a:tailEnd type="triangle"/>
+          </a:ln>
+        </p:spPr>
+        <p:style>
+          <a:lnRef idx="1">
+            <a:schemeClr val="accent1"/>
+          </a:lnRef>
+          <a:fillRef idx="0">
+            <a:schemeClr val="accent1"/>
+          </a:fillRef>
+          <a:effectRef idx="0">
+            <a:schemeClr val="accent1"/>
+          </a:effectRef>
+          <a:fontRef idx="minor">
+            <a:schemeClr val="tx1"/>
+          </a:fontRef>
+        </p:style>
+      </p:cxnSp>
+      <p:sp>
+        <p:nvSpPr>
+          <p:cNvPr id="19" name="文字方塊 18">
+            <a:extLst>
+              <a:ext uri="{FF2B5EF4-FFF2-40B4-BE49-F238E27FC236}">
+                <a16:creationId xmlns:a16="http://schemas.microsoft.com/office/drawing/2014/main" id="{DF8D6507-2820-46CD-BD17-D21C181D155A}"/>
+              </a:ext>
+            </a:extLst>
+          </p:cNvPr>
+          <p:cNvSpPr txBox="1"/>
+          <p:nvPr/>
+        </p:nvSpPr>
+        <p:spPr>
+          <a:xfrm>
+            <a:off x="3124200" y="3733800"/>
+            <a:ext cx="5448309" cy="369332"/>
+          </a:xfrm>
+          <a:prstGeom prst="rect">
+            <a:avLst/>
+          </a:prstGeom>
+          <a:noFill/>
+        </p:spPr>
+        <p:txBody>
+          <a:bodyPr wrap="square" rtlCol="0">
+            <a:spAutoFit/>
+          </a:bodyPr>
+          <a:lstStyle/>
+          <a:p>
+            <a:r>
+              <a:rPr lang="zh-TW" altLang="en-US" dirty="0"/>
+              <a:t>將執行資訊存為</a:t>
+            </a:r>
+            <a:r>
+              <a:rPr lang="en-US" altLang="zh-TW" dirty="0"/>
+              <a:t>log</a:t>
+            </a:r>
+            <a:r>
+              <a:rPr lang="zh-TW" altLang="en-US" dirty="0"/>
+              <a:t>，將交易訊息傳送至</a:t>
+            </a:r>
+            <a:r>
+              <a:rPr lang="en-US" altLang="zh-TW" dirty="0"/>
+              <a:t>line notify </a:t>
+            </a:r>
+            <a:r>
+              <a:rPr lang="en-US" altLang="zh-TW" dirty="0" err="1"/>
+              <a:t>api</a:t>
+            </a:r>
+            <a:endParaRPr lang="zh-TW" altLang="en-US" dirty="0"/>
+          </a:p>
+        </p:txBody>
+      </p:sp>
+      <p:sp>
+        <p:nvSpPr>
+          <p:cNvPr id="20" name="文字方塊 19">
+            <a:extLst>
+              <a:ext uri="{FF2B5EF4-FFF2-40B4-BE49-F238E27FC236}">
+                <a16:creationId xmlns:a16="http://schemas.microsoft.com/office/drawing/2014/main" id="{208BEEC1-E20A-4575-9166-32BA27B75928}"/>
+              </a:ext>
+            </a:extLst>
+          </p:cNvPr>
+          <p:cNvSpPr txBox="1"/>
+          <p:nvPr/>
+        </p:nvSpPr>
+        <p:spPr>
+          <a:xfrm>
+            <a:off x="6993509" y="4103132"/>
+            <a:ext cx="1572237" cy="369332"/>
+          </a:xfrm>
+          <a:prstGeom prst="rect">
+            <a:avLst/>
+          </a:prstGeom>
+          <a:noFill/>
+        </p:spPr>
+        <p:txBody>
+          <a:bodyPr wrap="square" rtlCol="0">
+            <a:spAutoFit/>
+          </a:bodyPr>
+          <a:lstStyle/>
+          <a:p>
+            <a:r>
+              <a:rPr lang="zh-TW" altLang="en-US" dirty="0"/>
+              <a:t>儲存模擬倉位</a:t>
             </a:r>
           </a:p>
         </p:txBody>
@@ -3968,12 +4975,27 @@
             <p:ph type="title"/>
           </p:nvPr>
         </p:nvSpPr>
-        <p:spPr/>
-        <p:txBody>
-          <a:bodyPr/>
-          <a:lstStyle/>
-          <a:p>
-            <a:endParaRPr lang="zh-TW" altLang="en-US"/>
+        <p:spPr>
+          <a:xfrm>
+            <a:off x="0" y="12790"/>
+            <a:ext cx="10515600" cy="1325563"/>
+          </a:xfrm>
+        </p:spPr>
+        <p:txBody>
+          <a:bodyPr/>
+          <a:lstStyle/>
+          <a:p>
+            <a:r>
+              <a:rPr lang="zh-TW" altLang="en-US" dirty="0"/>
+              <a:t>模擬單</a:t>
+            </a:r>
+            <a:br>
+              <a:rPr lang="en-US" altLang="zh-TW" dirty="0"/>
+            </a:br>
+            <a:r>
+              <a:rPr lang="zh-TW" altLang="en-US" sz="2800" dirty="0"/>
+              <a:t>說明</a:t>
+            </a:r>
           </a:p>
         </p:txBody>
       </p:sp>
@@ -3993,9 +5015,16 @@
             <p:ph idx="1"/>
           </p:nvPr>
         </p:nvSpPr>
-        <p:spPr/>
-        <p:txBody>
-          <a:bodyPr/>
+        <p:spPr>
+          <a:xfrm>
+            <a:off x="838200" y="1825624"/>
+            <a:ext cx="10947400" cy="4633845"/>
+          </a:xfrm>
+        </p:spPr>
+        <p:txBody>
+          <a:bodyPr>
+            <a:normAutofit/>
+          </a:bodyPr>
           <a:lstStyle/>
           <a:p>
             <a:endParaRPr lang="en-US" altLang="zh-TW" dirty="0"/>
@@ -4035,34 +5064,6 @@
           </a:p>
           <a:p>
             <a:endParaRPr lang="en-US" altLang="zh-TW" dirty="0"/>
-          </a:p>
-          <a:p>
-            <a:r>
-              <a:rPr lang="zh-TW" altLang="en-US" dirty="0"/>
-              <a:t>目前程式設定為一啟動會先立即找尋一次價平資訊</a:t>
-            </a:r>
-            <a:endParaRPr lang="en-US" altLang="zh-TW" dirty="0"/>
-          </a:p>
-          <a:p>
-            <a:r>
-              <a:rPr lang="zh-TW" altLang="en-US" dirty="0"/>
-              <a:t>之後再依照</a:t>
-            </a:r>
-            <a:r>
-              <a:rPr lang="en-US" altLang="zh-TW" dirty="0"/>
-              <a:t>config</a:t>
-            </a:r>
-            <a:r>
-              <a:rPr lang="zh-TW" altLang="en-US" dirty="0"/>
-              <a:t>設定時間印出相關資訊</a:t>
-            </a:r>
-            <a:endParaRPr lang="en-US" altLang="zh-TW" dirty="0"/>
-          </a:p>
-          <a:p>
-            <a:r>
-              <a:rPr lang="zh-TW" altLang="en-US" dirty="0"/>
-              <a:t>如右下圖所示</a:t>
-            </a:r>
           </a:p>
         </p:txBody>
       </p:sp>
@@ -4252,12 +5253,241 @@
           </a:p>
         </p:txBody>
       </p:sp>
+    </p:spTree>
+    <p:extLst>
+      <p:ext uri="{BB962C8B-B14F-4D97-AF65-F5344CB8AC3E}">
+        <p14:creationId xmlns:p14="http://schemas.microsoft.com/office/powerpoint/2010/main" val="3774804959"/>
+      </p:ext>
+    </p:extLst>
+  </p:cSld>
+  <p:clrMapOvr>
+    <a:masterClrMapping/>
+  </p:clrMapOvr>
+</p:sld>
+</file>
+
+<file path=ppt/slides/slide5.xml><?xml version="1.0" encoding="utf-8"?>
+<p:sld xmlns:a="http://schemas.openxmlformats.org/drawingml/2006/main" xmlns:r="http://schemas.openxmlformats.org/officeDocument/2006/relationships" xmlns:p="http://schemas.openxmlformats.org/presentationml/2006/main">
+  <p:cSld>
+    <p:spTree>
+      <p:nvGrpSpPr>
+        <p:cNvPr id="1" name=""/>
+        <p:cNvGrpSpPr/>
+        <p:nvPr/>
+      </p:nvGrpSpPr>
+      <p:grpSpPr>
+        <a:xfrm>
+          <a:off x="0" y="0"/>
+          <a:ext cx="0" cy="0"/>
+          <a:chOff x="0" y="0"/>
+          <a:chExt cx="0" cy="0"/>
+        </a:xfrm>
+      </p:grpSpPr>
+      <p:sp>
+        <p:nvSpPr>
+          <p:cNvPr id="3" name="內容版面配置區 2">
+            <a:extLst>
+              <a:ext uri="{FF2B5EF4-FFF2-40B4-BE49-F238E27FC236}">
+                <a16:creationId xmlns:a16="http://schemas.microsoft.com/office/drawing/2014/main" id="{754BE89D-0A6A-49B4-8FD3-E2A7B8E7835A}"/>
+              </a:ext>
+            </a:extLst>
+          </p:cNvPr>
+          <p:cNvSpPr>
+            <a:spLocks noGrp="1"/>
+          </p:cNvSpPr>
+          <p:nvPr>
+            <p:ph idx="1"/>
+          </p:nvPr>
+        </p:nvSpPr>
+        <p:spPr/>
+        <p:txBody>
+          <a:bodyPr/>
+          <a:lstStyle/>
+          <a:p>
+            <a:r>
+              <a:rPr lang="zh-TW" altLang="en-US" dirty="0"/>
+              <a:t>目前程式設定為一啟動會先立即找尋一次價平資訊</a:t>
+            </a:r>
+            <a:endParaRPr lang="en-US" altLang="zh-TW" dirty="0"/>
+          </a:p>
+          <a:p>
+            <a:r>
+              <a:rPr lang="zh-TW" altLang="en-US" dirty="0"/>
+              <a:t>之後再依照</a:t>
+            </a:r>
+            <a:r>
+              <a:rPr lang="en-US" altLang="zh-TW" dirty="0"/>
+              <a:t>config</a:t>
+            </a:r>
+            <a:r>
+              <a:rPr lang="zh-TW" altLang="en-US" dirty="0"/>
+              <a:t>設定時間及</a:t>
+            </a:r>
+            <a:r>
+              <a:rPr lang="en-US" altLang="zh-TW" dirty="0"/>
+              <a:t>json</a:t>
+            </a:r>
+            <a:r>
+              <a:rPr lang="zh-TW" altLang="en-US" dirty="0"/>
+              <a:t>檔參數，成交當下價平之模擬單</a:t>
+            </a:r>
+            <a:endParaRPr lang="en-US" altLang="zh-TW" dirty="0"/>
+          </a:p>
+          <a:p>
+            <a:pPr lvl="1"/>
+            <a:r>
+              <a:rPr lang="zh-TW" altLang="en-US" dirty="0"/>
+              <a:t>時間參數</a:t>
+            </a:r>
+            <a:r>
+              <a:rPr lang="en-US" altLang="zh-TW" dirty="0"/>
+              <a:t>:</a:t>
+            </a:r>
+            <a:r>
+              <a:rPr lang="zh-TW" altLang="en-US" dirty="0"/>
+              <a:t> </a:t>
+            </a:r>
+            <a:r>
+              <a:rPr lang="en-US" altLang="zh-TW" dirty="0" err="1"/>
+              <a:t>get_simulation_time</a:t>
+            </a:r>
+            <a:endParaRPr lang="en-US" altLang="zh-TW" dirty="0"/>
+          </a:p>
+          <a:p>
+            <a:pPr lvl="1"/>
+            <a:r>
+              <a:rPr lang="zh-TW" altLang="en-US" dirty="0"/>
+              <a:t>下單資訊</a:t>
+            </a:r>
+            <a:r>
+              <a:rPr lang="en-US" altLang="zh-TW" dirty="0"/>
+              <a:t>:</a:t>
+            </a:r>
+            <a:r>
+              <a:rPr lang="zh-TW" altLang="en-US" dirty="0"/>
+              <a:t> </a:t>
+            </a:r>
+            <a:r>
+              <a:rPr lang="en-US" altLang="zh-TW" dirty="0"/>
+              <a:t>simulation</a:t>
+            </a:r>
+            <a:r>
+              <a:rPr lang="zh-TW" altLang="en-US" dirty="0"/>
+              <a:t>字樣參數</a:t>
+            </a:r>
+            <a:endParaRPr lang="en-US" altLang="zh-TW" dirty="0"/>
+          </a:p>
+          <a:p>
+            <a:r>
+              <a:rPr lang="zh-TW" altLang="en-US" dirty="0"/>
+              <a:t>如右下圖所示</a:t>
+            </a:r>
+          </a:p>
+          <a:p>
+            <a:pPr marL="457200" lvl="1" indent="0">
+              <a:buNone/>
+            </a:pPr>
+            <a:endParaRPr lang="en-US" altLang="zh-TW" dirty="0"/>
+          </a:p>
+        </p:txBody>
+      </p:sp>
+      <p:sp>
+        <p:nvSpPr>
+          <p:cNvPr id="4" name="標題 1">
+            <a:extLst>
+              <a:ext uri="{FF2B5EF4-FFF2-40B4-BE49-F238E27FC236}">
+                <a16:creationId xmlns:a16="http://schemas.microsoft.com/office/drawing/2014/main" id="{98F7A448-57B5-4DCE-8B47-EEF5CD0E3EDA}"/>
+              </a:ext>
+            </a:extLst>
+          </p:cNvPr>
+          <p:cNvSpPr txBox="1">
+            <a:spLocks/>
+          </p:cNvSpPr>
+          <p:nvPr/>
+        </p:nvSpPr>
+        <p:spPr>
+          <a:xfrm>
+            <a:off x="0" y="12790"/>
+            <a:ext cx="10515600" cy="1325563"/>
+          </a:xfrm>
+          <a:prstGeom prst="rect">
+            <a:avLst/>
+          </a:prstGeom>
+        </p:spPr>
+        <p:txBody>
+          <a:bodyPr vert="horz" lIns="91440" tIns="45720" rIns="91440" bIns="45720" rtlCol="0" anchor="ctr">
+            <a:normAutofit/>
+          </a:bodyPr>
+          <a:lstStyle>
+            <a:lvl1pPr algn="l" defTabSz="914400" rtl="0" eaLnBrk="1" latinLnBrk="0" hangingPunct="1">
+              <a:lnSpc>
+                <a:spcPct val="90000"/>
+              </a:lnSpc>
+              <a:spcBef>
+                <a:spcPct val="0"/>
+              </a:spcBef>
+              <a:buNone/>
+              <a:defRPr sz="4400" kern="1200">
+                <a:solidFill>
+                  <a:schemeClr val="tx1"/>
+                </a:solidFill>
+                <a:latin typeface="+mj-lt"/>
+                <a:ea typeface="+mj-ea"/>
+                <a:cs typeface="+mj-cs"/>
+              </a:defRPr>
+            </a:lvl1pPr>
+          </a:lstStyle>
+          <a:p>
+            <a:r>
+              <a:rPr lang="zh-TW" altLang="en-US" dirty="0"/>
+              <a:t>模擬單</a:t>
+            </a:r>
+            <a:endParaRPr lang="en-US" altLang="zh-TW" dirty="0"/>
+          </a:p>
+          <a:p>
+            <a:r>
+              <a:rPr lang="zh-TW" altLang="en-US" sz="2800" dirty="0"/>
+              <a:t>功能一</a:t>
+            </a:r>
+          </a:p>
+        </p:txBody>
+      </p:sp>
       <p:pic>
         <p:nvPicPr>
-          <p:cNvPr id="9" name="圖片 8">
-            <a:extLst>
-              <a:ext uri="{FF2B5EF4-FFF2-40B4-BE49-F238E27FC236}">
-                <a16:creationId xmlns:a16="http://schemas.microsoft.com/office/drawing/2014/main" id="{7D3348AE-4299-4413-BFF4-DFFCBBE7D8F1}"/>
+          <p:cNvPr id="5" name="圖片 4">
+            <a:extLst>
+              <a:ext uri="{FF2B5EF4-FFF2-40B4-BE49-F238E27FC236}">
+                <a16:creationId xmlns:a16="http://schemas.microsoft.com/office/drawing/2014/main" id="{A2C4962F-8850-4CB1-B6D5-C115C70BE44B}"/>
+              </a:ext>
+            </a:extLst>
+          </p:cNvPr>
+          <p:cNvPicPr>
+            <a:picLocks noChangeAspect="1"/>
+          </p:cNvPicPr>
+          <p:nvPr/>
+        </p:nvPicPr>
+        <p:blipFill>
+          <a:blip r:embed="rId2"/>
+          <a:stretch>
+            <a:fillRect/>
+          </a:stretch>
+        </p:blipFill>
+        <p:spPr>
+          <a:xfrm>
+            <a:off x="7341799" y="4952999"/>
+            <a:ext cx="4850201" cy="1536565"/>
+          </a:xfrm>
+          <a:prstGeom prst="rect">
+            <a:avLst/>
+          </a:prstGeom>
+        </p:spPr>
+      </p:pic>
+      <p:pic>
+        <p:nvPicPr>
+          <p:cNvPr id="2" name="圖片 1">
+            <a:extLst>
+              <a:ext uri="{FF2B5EF4-FFF2-40B4-BE49-F238E27FC236}">
+                <a16:creationId xmlns:a16="http://schemas.microsoft.com/office/drawing/2014/main" id="{3A2D578D-4663-4964-85BE-E15DF0A490FE}"/>
               </a:ext>
             </a:extLst>
           </p:cNvPr>
@@ -4274,8 +5504,8 @@
         </p:blipFill>
         <p:spPr>
           <a:xfrm>
-            <a:off x="8135660" y="5194814"/>
-            <a:ext cx="3457575" cy="1095375"/>
+            <a:off x="3171824" y="4952999"/>
+            <a:ext cx="3899518" cy="1536565"/>
           </a:xfrm>
           <a:prstGeom prst="rect">
             <a:avLst/>
@@ -4285,7 +5515,770 @@
     </p:spTree>
     <p:extLst>
       <p:ext uri="{BB962C8B-B14F-4D97-AF65-F5344CB8AC3E}">
-        <p14:creationId xmlns:p14="http://schemas.microsoft.com/office/powerpoint/2010/main" val="3774804959"/>
+        <p14:creationId xmlns:p14="http://schemas.microsoft.com/office/powerpoint/2010/main" val="2421643243"/>
+      </p:ext>
+    </p:extLst>
+  </p:cSld>
+  <p:clrMapOvr>
+    <a:masterClrMapping/>
+  </p:clrMapOvr>
+</p:sld>
+</file>
+
+<file path=ppt/slides/slide6.xml><?xml version="1.0" encoding="utf-8"?>
+<p:sld xmlns:a="http://schemas.openxmlformats.org/drawingml/2006/main" xmlns:r="http://schemas.openxmlformats.org/officeDocument/2006/relationships" xmlns:p="http://schemas.openxmlformats.org/presentationml/2006/main">
+  <p:cSld>
+    <p:spTree>
+      <p:nvGrpSpPr>
+        <p:cNvPr id="1" name=""/>
+        <p:cNvGrpSpPr/>
+        <p:nvPr/>
+      </p:nvGrpSpPr>
+      <p:grpSpPr>
+        <a:xfrm>
+          <a:off x="0" y="0"/>
+          <a:ext cx="0" cy="0"/>
+          <a:chOff x="0" y="0"/>
+          <a:chExt cx="0" cy="0"/>
+        </a:xfrm>
+      </p:grpSpPr>
+      <p:sp>
+        <p:nvSpPr>
+          <p:cNvPr id="3" name="內容版面配置區 2">
+            <a:extLst>
+              <a:ext uri="{FF2B5EF4-FFF2-40B4-BE49-F238E27FC236}">
+                <a16:creationId xmlns:a16="http://schemas.microsoft.com/office/drawing/2014/main" id="{754BE89D-0A6A-49B4-8FD3-E2A7B8E7835A}"/>
+              </a:ext>
+            </a:extLst>
+          </p:cNvPr>
+          <p:cNvSpPr>
+            <a:spLocks noGrp="1"/>
+          </p:cNvSpPr>
+          <p:nvPr>
+            <p:ph idx="1"/>
+          </p:nvPr>
+        </p:nvSpPr>
+        <p:spPr/>
+        <p:txBody>
+          <a:bodyPr/>
+          <a:lstStyle/>
+          <a:p>
+            <a:r>
+              <a:rPr lang="zh-TW" altLang="en-US" dirty="0"/>
+              <a:t>在達到停損條件後</a:t>
+            </a:r>
+            <a:r>
+              <a:rPr lang="en-US" altLang="zh-TW" dirty="0"/>
+              <a:t>(a. </a:t>
+            </a:r>
+            <a:r>
+              <a:rPr lang="zh-TW" altLang="en-US" dirty="0"/>
+              <a:t>成交價 </a:t>
+            </a:r>
+            <a:r>
+              <a:rPr lang="en-US" altLang="zh-TW" dirty="0"/>
+              <a:t>or b. </a:t>
+            </a:r>
+            <a:r>
+              <a:rPr lang="zh-TW" altLang="en-US" dirty="0"/>
+              <a:t>強制平倉時間</a:t>
+            </a:r>
+            <a:r>
+              <a:rPr lang="en-US" altLang="zh-TW" dirty="0"/>
+              <a:t>)</a:t>
+            </a:r>
+            <a:r>
+              <a:rPr lang="zh-TW" altLang="en-US" dirty="0"/>
+              <a:t>平倉</a:t>
+            </a:r>
+            <a:endParaRPr lang="en-US" altLang="zh-TW" dirty="0"/>
+          </a:p>
+          <a:p>
+            <a:r>
+              <a:rPr lang="zh-TW" altLang="en-US" dirty="0"/>
+              <a:t>成交價固定設定損失</a:t>
+            </a:r>
+            <a:r>
+              <a:rPr lang="en-US" altLang="zh-TW" dirty="0"/>
+              <a:t>1.4</a:t>
+            </a:r>
+            <a:r>
+              <a:rPr lang="zh-TW" altLang="en-US" dirty="0"/>
+              <a:t>倍以上</a:t>
+            </a:r>
+            <a:endParaRPr lang="en-US" altLang="zh-TW" dirty="0"/>
+          </a:p>
+          <a:p>
+            <a:r>
+              <a:rPr lang="zh-TW" altLang="en-US" dirty="0"/>
+              <a:t>強制平倉時間依照</a:t>
+            </a:r>
+            <a:r>
+              <a:rPr lang="en-US" altLang="zh-TW" dirty="0"/>
+              <a:t>JSON</a:t>
+            </a:r>
+            <a:r>
+              <a:rPr lang="zh-TW" altLang="en-US" dirty="0"/>
+              <a:t>檔之</a:t>
+            </a:r>
+            <a:r>
+              <a:rPr lang="en-US" altLang="zh-TW" dirty="0" err="1"/>
+              <a:t>get_cover_time</a:t>
+            </a:r>
+            <a:r>
+              <a:rPr lang="zh-TW" altLang="en-US" dirty="0"/>
+              <a:t>參數</a:t>
+            </a:r>
+            <a:endParaRPr lang="en-US" altLang="zh-TW" dirty="0"/>
+          </a:p>
+          <a:p>
+            <a:pPr lvl="1"/>
+            <a:r>
+              <a:rPr lang="zh-TW" altLang="en-US" dirty="0"/>
+              <a:t>此參數與實單之平倉時間共用</a:t>
+            </a:r>
+            <a:endParaRPr lang="en-US" altLang="zh-TW" dirty="0"/>
+          </a:p>
+          <a:p>
+            <a:pPr lvl="1"/>
+            <a:r>
+              <a:rPr lang="zh-TW" altLang="en-US" dirty="0"/>
+              <a:t>需搭配</a:t>
+            </a:r>
+            <a:r>
+              <a:rPr lang="en-US" altLang="zh-TW" dirty="0" err="1"/>
+              <a:t>simulation_mode</a:t>
+            </a:r>
+            <a:r>
+              <a:rPr lang="zh-TW" altLang="en-US" dirty="0"/>
+              <a:t>參數</a:t>
+            </a:r>
+            <a:endParaRPr lang="en-US" altLang="zh-TW" dirty="0"/>
+          </a:p>
+        </p:txBody>
+      </p:sp>
+      <p:sp>
+        <p:nvSpPr>
+          <p:cNvPr id="4" name="標題 1">
+            <a:extLst>
+              <a:ext uri="{FF2B5EF4-FFF2-40B4-BE49-F238E27FC236}">
+                <a16:creationId xmlns:a16="http://schemas.microsoft.com/office/drawing/2014/main" id="{98F7A448-57B5-4DCE-8B47-EEF5CD0E3EDA}"/>
+              </a:ext>
+            </a:extLst>
+          </p:cNvPr>
+          <p:cNvSpPr txBox="1">
+            <a:spLocks/>
+          </p:cNvSpPr>
+          <p:nvPr/>
+        </p:nvSpPr>
+        <p:spPr>
+          <a:xfrm>
+            <a:off x="0" y="12790"/>
+            <a:ext cx="10515600" cy="1325563"/>
+          </a:xfrm>
+          <a:prstGeom prst="rect">
+            <a:avLst/>
+          </a:prstGeom>
+        </p:spPr>
+        <p:txBody>
+          <a:bodyPr vert="horz" lIns="91440" tIns="45720" rIns="91440" bIns="45720" rtlCol="0" anchor="ctr">
+            <a:normAutofit/>
+          </a:bodyPr>
+          <a:lstStyle>
+            <a:lvl1pPr algn="l" defTabSz="914400" rtl="0" eaLnBrk="1" latinLnBrk="0" hangingPunct="1">
+              <a:lnSpc>
+                <a:spcPct val="90000"/>
+              </a:lnSpc>
+              <a:spcBef>
+                <a:spcPct val="0"/>
+              </a:spcBef>
+              <a:buNone/>
+              <a:defRPr sz="4400" kern="1200">
+                <a:solidFill>
+                  <a:schemeClr val="tx1"/>
+                </a:solidFill>
+                <a:latin typeface="+mj-lt"/>
+                <a:ea typeface="+mj-ea"/>
+                <a:cs typeface="+mj-cs"/>
+              </a:defRPr>
+            </a:lvl1pPr>
+          </a:lstStyle>
+          <a:p>
+            <a:r>
+              <a:rPr lang="zh-TW" altLang="en-US" dirty="0"/>
+              <a:t>模擬單</a:t>
+            </a:r>
+            <a:endParaRPr lang="en-US" altLang="zh-TW" dirty="0"/>
+          </a:p>
+          <a:p>
+            <a:r>
+              <a:rPr lang="zh-TW" altLang="en-US" sz="2800" dirty="0"/>
+              <a:t>功能二</a:t>
+            </a:r>
+          </a:p>
+        </p:txBody>
+      </p:sp>
+    </p:spTree>
+    <p:extLst>
+      <p:ext uri="{BB962C8B-B14F-4D97-AF65-F5344CB8AC3E}">
+        <p14:creationId xmlns:p14="http://schemas.microsoft.com/office/powerpoint/2010/main" val="2611216715"/>
+      </p:ext>
+    </p:extLst>
+  </p:cSld>
+  <p:clrMapOvr>
+    <a:masterClrMapping/>
+  </p:clrMapOvr>
+</p:sld>
+</file>
+
+<file path=ppt/slides/slide7.xml><?xml version="1.0" encoding="utf-8"?>
+<p:sld xmlns:a="http://schemas.openxmlformats.org/drawingml/2006/main" xmlns:r="http://schemas.openxmlformats.org/officeDocument/2006/relationships" xmlns:p="http://schemas.openxmlformats.org/presentationml/2006/main">
+  <p:cSld>
+    <p:spTree>
+      <p:nvGrpSpPr>
+        <p:cNvPr id="1" name=""/>
+        <p:cNvGrpSpPr/>
+        <p:nvPr/>
+      </p:nvGrpSpPr>
+      <p:grpSpPr>
+        <a:xfrm>
+          <a:off x="0" y="0"/>
+          <a:ext cx="0" cy="0"/>
+          <a:chOff x="0" y="0"/>
+          <a:chExt cx="0" cy="0"/>
+        </a:xfrm>
+      </p:grpSpPr>
+      <p:sp>
+        <p:nvSpPr>
+          <p:cNvPr id="3" name="內容版面配置區 2">
+            <a:extLst>
+              <a:ext uri="{FF2B5EF4-FFF2-40B4-BE49-F238E27FC236}">
+                <a16:creationId xmlns:a16="http://schemas.microsoft.com/office/drawing/2014/main" id="{754BE89D-0A6A-49B4-8FD3-E2A7B8E7835A}"/>
+              </a:ext>
+            </a:extLst>
+          </p:cNvPr>
+          <p:cNvSpPr>
+            <a:spLocks noGrp="1"/>
+          </p:cNvSpPr>
+          <p:nvPr>
+            <p:ph idx="1"/>
+          </p:nvPr>
+        </p:nvSpPr>
+        <p:spPr/>
+        <p:txBody>
+          <a:bodyPr/>
+          <a:lstStyle/>
+          <a:p>
+            <a:r>
+              <a:rPr lang="zh-TW" altLang="en-US" dirty="0"/>
+              <a:t>會自動記憶程式目前持有之模擬倉位</a:t>
+            </a:r>
+            <a:endParaRPr lang="en-US" altLang="zh-TW" dirty="0"/>
+          </a:p>
+          <a:p>
+            <a:r>
+              <a:rPr lang="zh-TW" altLang="en-US" dirty="0"/>
+              <a:t>同上</a:t>
+            </a:r>
+            <a:r>
+              <a:rPr lang="en-US" altLang="zh-TW" dirty="0"/>
+              <a:t>, </a:t>
+            </a:r>
+            <a:r>
+              <a:rPr lang="zh-TW" altLang="en-US" dirty="0"/>
+              <a:t>程式開始執行時會讀取上次有無遺留倉位</a:t>
+            </a:r>
+          </a:p>
+          <a:p>
+            <a:endParaRPr lang="en-US" altLang="zh-TW" dirty="0"/>
+          </a:p>
+        </p:txBody>
+      </p:sp>
+      <p:sp>
+        <p:nvSpPr>
+          <p:cNvPr id="4" name="標題 1">
+            <a:extLst>
+              <a:ext uri="{FF2B5EF4-FFF2-40B4-BE49-F238E27FC236}">
+                <a16:creationId xmlns:a16="http://schemas.microsoft.com/office/drawing/2014/main" id="{98F7A448-57B5-4DCE-8B47-EEF5CD0E3EDA}"/>
+              </a:ext>
+            </a:extLst>
+          </p:cNvPr>
+          <p:cNvSpPr txBox="1">
+            <a:spLocks/>
+          </p:cNvSpPr>
+          <p:nvPr/>
+        </p:nvSpPr>
+        <p:spPr>
+          <a:xfrm>
+            <a:off x="0" y="12790"/>
+            <a:ext cx="10515600" cy="1325563"/>
+          </a:xfrm>
+          <a:prstGeom prst="rect">
+            <a:avLst/>
+          </a:prstGeom>
+        </p:spPr>
+        <p:txBody>
+          <a:bodyPr vert="horz" lIns="91440" tIns="45720" rIns="91440" bIns="45720" rtlCol="0" anchor="ctr">
+            <a:normAutofit/>
+          </a:bodyPr>
+          <a:lstStyle>
+            <a:lvl1pPr algn="l" defTabSz="914400" rtl="0" eaLnBrk="1" latinLnBrk="0" hangingPunct="1">
+              <a:lnSpc>
+                <a:spcPct val="90000"/>
+              </a:lnSpc>
+              <a:spcBef>
+                <a:spcPct val="0"/>
+              </a:spcBef>
+              <a:buNone/>
+              <a:defRPr sz="4400" kern="1200">
+                <a:solidFill>
+                  <a:schemeClr val="tx1"/>
+                </a:solidFill>
+                <a:latin typeface="+mj-lt"/>
+                <a:ea typeface="+mj-ea"/>
+                <a:cs typeface="+mj-cs"/>
+              </a:defRPr>
+            </a:lvl1pPr>
+          </a:lstStyle>
+          <a:p>
+            <a:r>
+              <a:rPr lang="zh-TW" altLang="en-US" dirty="0"/>
+              <a:t>模擬單</a:t>
+            </a:r>
+            <a:endParaRPr lang="en-US" altLang="zh-TW" dirty="0"/>
+          </a:p>
+          <a:p>
+            <a:r>
+              <a:rPr lang="zh-TW" altLang="en-US" sz="2800" dirty="0"/>
+              <a:t>功能三</a:t>
+            </a:r>
+          </a:p>
+        </p:txBody>
+      </p:sp>
+    </p:spTree>
+    <p:extLst>
+      <p:ext uri="{BB962C8B-B14F-4D97-AF65-F5344CB8AC3E}">
+        <p14:creationId xmlns:p14="http://schemas.microsoft.com/office/powerpoint/2010/main" val="2767431060"/>
+      </p:ext>
+    </p:extLst>
+  </p:cSld>
+  <p:clrMapOvr>
+    <a:masterClrMapping/>
+  </p:clrMapOvr>
+</p:sld>
+</file>
+
+<file path=ppt/slides/slide8.xml><?xml version="1.0" encoding="utf-8"?>
+<p:sld xmlns:a="http://schemas.openxmlformats.org/drawingml/2006/main" xmlns:r="http://schemas.openxmlformats.org/officeDocument/2006/relationships" xmlns:p="http://schemas.openxmlformats.org/presentationml/2006/main">
+  <p:cSld>
+    <p:spTree>
+      <p:nvGrpSpPr>
+        <p:cNvPr id="1" name=""/>
+        <p:cNvGrpSpPr/>
+        <p:nvPr/>
+      </p:nvGrpSpPr>
+      <p:grpSpPr>
+        <a:xfrm>
+          <a:off x="0" y="0"/>
+          <a:ext cx="0" cy="0"/>
+          <a:chOff x="0" y="0"/>
+          <a:chExt cx="0" cy="0"/>
+        </a:xfrm>
+      </p:grpSpPr>
+      <p:sp>
+        <p:nvSpPr>
+          <p:cNvPr id="3" name="內容版面配置區 2">
+            <a:extLst>
+              <a:ext uri="{FF2B5EF4-FFF2-40B4-BE49-F238E27FC236}">
+                <a16:creationId xmlns:a16="http://schemas.microsoft.com/office/drawing/2014/main" id="{754BE89D-0A6A-49B4-8FD3-E2A7B8E7835A}"/>
+              </a:ext>
+            </a:extLst>
+          </p:cNvPr>
+          <p:cNvSpPr>
+            <a:spLocks noGrp="1"/>
+          </p:cNvSpPr>
+          <p:nvPr>
+            <p:ph idx="1"/>
+          </p:nvPr>
+        </p:nvSpPr>
+        <p:spPr/>
+        <p:txBody>
+          <a:bodyPr/>
+          <a:lstStyle/>
+          <a:p>
+            <a:r>
+              <a:rPr lang="zh-TW" altLang="en-US" dirty="0"/>
+              <a:t>使用</a:t>
+            </a:r>
+            <a:r>
+              <a:rPr lang="en-US" altLang="zh-TW" dirty="0"/>
+              <a:t>JSON</a:t>
+            </a:r>
+            <a:r>
+              <a:rPr lang="zh-TW" altLang="en-US" dirty="0"/>
+              <a:t>檔之</a:t>
+            </a:r>
+            <a:r>
+              <a:rPr lang="en-US" altLang="zh-TW" dirty="0"/>
+              <a:t>cover</a:t>
+            </a:r>
+            <a:r>
+              <a:rPr lang="zh-TW" altLang="en-US" dirty="0"/>
+              <a:t>相關參數</a:t>
+            </a:r>
+            <a:endParaRPr lang="en-US" altLang="zh-TW" dirty="0"/>
+          </a:p>
+          <a:p>
+            <a:r>
+              <a:rPr lang="zh-TW" altLang="en-US" dirty="0"/>
+              <a:t>口數是</a:t>
+            </a:r>
+            <a:r>
+              <a:rPr lang="en-US" altLang="zh-TW" dirty="0"/>
+              <a:t>CALL PUT</a:t>
+            </a:r>
+            <a:r>
+              <a:rPr lang="zh-TW" altLang="en-US" dirty="0"/>
+              <a:t>共用</a:t>
+            </a:r>
+            <a:r>
+              <a:rPr lang="en-US" altLang="zh-TW" dirty="0"/>
+              <a:t>put &amp; call</a:t>
+            </a:r>
+            <a:r>
+              <a:rPr lang="zh-TW" altLang="en-US" dirty="0"/>
+              <a:t>可以設置各自的履約價</a:t>
+            </a:r>
+            <a:endParaRPr lang="en-US" altLang="zh-TW" dirty="0"/>
+          </a:p>
+          <a:p>
+            <a:r>
+              <a:rPr lang="zh-TW" altLang="en-US" dirty="0"/>
+              <a:t>平倉只考慮買進平倉單</a:t>
+            </a:r>
+            <a:endParaRPr lang="en-US" altLang="zh-TW" dirty="0"/>
+          </a:p>
+          <a:p>
+            <a:r>
+              <a:rPr lang="zh-TW" altLang="en-US" dirty="0"/>
+              <a:t>下的平倉</a:t>
+            </a:r>
+            <a:r>
+              <a:rPr lang="en-US" altLang="zh-TW" dirty="0"/>
+              <a:t>order</a:t>
+            </a:r>
+            <a:r>
+              <a:rPr lang="zh-TW" altLang="en-US" dirty="0"/>
+              <a:t>類型皆為</a:t>
+            </a:r>
+            <a:r>
+              <a:rPr lang="en-US" altLang="zh-TW" dirty="0"/>
+              <a:t>cover, </a:t>
+            </a:r>
+            <a:r>
+              <a:rPr lang="zh-TW" altLang="en-US" dirty="0"/>
+              <a:t>避免無倉位反而多買進的情形</a:t>
+            </a:r>
+            <a:endParaRPr lang="en-US" altLang="zh-TW" dirty="0"/>
+          </a:p>
+        </p:txBody>
+      </p:sp>
+      <p:sp>
+        <p:nvSpPr>
+          <p:cNvPr id="4" name="標題 1">
+            <a:extLst>
+              <a:ext uri="{FF2B5EF4-FFF2-40B4-BE49-F238E27FC236}">
+                <a16:creationId xmlns:a16="http://schemas.microsoft.com/office/drawing/2014/main" id="{98F7A448-57B5-4DCE-8B47-EEF5CD0E3EDA}"/>
+              </a:ext>
+            </a:extLst>
+          </p:cNvPr>
+          <p:cNvSpPr txBox="1">
+            <a:spLocks/>
+          </p:cNvSpPr>
+          <p:nvPr/>
+        </p:nvSpPr>
+        <p:spPr>
+          <a:xfrm>
+            <a:off x="0" y="12790"/>
+            <a:ext cx="10515600" cy="1325563"/>
+          </a:xfrm>
+          <a:prstGeom prst="rect">
+            <a:avLst/>
+          </a:prstGeom>
+        </p:spPr>
+        <p:txBody>
+          <a:bodyPr vert="horz" lIns="91440" tIns="45720" rIns="91440" bIns="45720" rtlCol="0" anchor="ctr">
+            <a:normAutofit/>
+          </a:bodyPr>
+          <a:lstStyle>
+            <a:lvl1pPr algn="l" defTabSz="914400" rtl="0" eaLnBrk="1" latinLnBrk="0" hangingPunct="1">
+              <a:lnSpc>
+                <a:spcPct val="90000"/>
+              </a:lnSpc>
+              <a:spcBef>
+                <a:spcPct val="0"/>
+              </a:spcBef>
+              <a:buNone/>
+              <a:defRPr sz="4400" kern="1200">
+                <a:solidFill>
+                  <a:schemeClr val="tx1"/>
+                </a:solidFill>
+                <a:latin typeface="+mj-lt"/>
+                <a:ea typeface="+mj-ea"/>
+                <a:cs typeface="+mj-cs"/>
+              </a:defRPr>
+            </a:lvl1pPr>
+          </a:lstStyle>
+          <a:p>
+            <a:r>
+              <a:rPr lang="zh-TW" altLang="en-US" dirty="0"/>
+              <a:t>實單平倉</a:t>
+            </a:r>
+            <a:endParaRPr lang="en-US" altLang="zh-TW" dirty="0"/>
+          </a:p>
+          <a:p>
+            <a:r>
+              <a:rPr lang="zh-TW" altLang="en-US" sz="2800" dirty="0"/>
+              <a:t>說明</a:t>
+            </a:r>
+          </a:p>
+        </p:txBody>
+      </p:sp>
+      <p:pic>
+        <p:nvPicPr>
+          <p:cNvPr id="2" name="圖片 1">
+            <a:extLst>
+              <a:ext uri="{FF2B5EF4-FFF2-40B4-BE49-F238E27FC236}">
+                <a16:creationId xmlns:a16="http://schemas.microsoft.com/office/drawing/2014/main" id="{E21A4FF7-A855-4C24-9881-6356E073D00A}"/>
+              </a:ext>
+            </a:extLst>
+          </p:cNvPr>
+          <p:cNvPicPr>
+            <a:picLocks noChangeAspect="1"/>
+          </p:cNvPicPr>
+          <p:nvPr/>
+        </p:nvPicPr>
+        <p:blipFill>
+          <a:blip r:embed="rId2"/>
+          <a:stretch>
+            <a:fillRect/>
+          </a:stretch>
+        </p:blipFill>
+        <p:spPr>
+          <a:xfrm>
+            <a:off x="8430369" y="12790"/>
+            <a:ext cx="3761632" cy="1812835"/>
+          </a:xfrm>
+          <a:prstGeom prst="rect">
+            <a:avLst/>
+          </a:prstGeom>
+        </p:spPr>
+      </p:pic>
+    </p:spTree>
+    <p:extLst>
+      <p:ext uri="{BB962C8B-B14F-4D97-AF65-F5344CB8AC3E}">
+        <p14:creationId xmlns:p14="http://schemas.microsoft.com/office/powerpoint/2010/main" val="819572376"/>
+      </p:ext>
+    </p:extLst>
+  </p:cSld>
+  <p:clrMapOvr>
+    <a:masterClrMapping/>
+  </p:clrMapOvr>
+</p:sld>
+</file>
+
+<file path=ppt/slides/slide9.xml><?xml version="1.0" encoding="utf-8"?>
+<p:sld xmlns:a="http://schemas.openxmlformats.org/drawingml/2006/main" xmlns:r="http://schemas.openxmlformats.org/officeDocument/2006/relationships" xmlns:p="http://schemas.openxmlformats.org/presentationml/2006/main">
+  <p:cSld>
+    <p:spTree>
+      <p:nvGrpSpPr>
+        <p:cNvPr id="1" name=""/>
+        <p:cNvGrpSpPr/>
+        <p:nvPr/>
+      </p:nvGrpSpPr>
+      <p:grpSpPr>
+        <a:xfrm>
+          <a:off x="0" y="0"/>
+          <a:ext cx="0" cy="0"/>
+          <a:chOff x="0" y="0"/>
+          <a:chExt cx="0" cy="0"/>
+        </a:xfrm>
+      </p:grpSpPr>
+      <p:sp>
+        <p:nvSpPr>
+          <p:cNvPr id="3" name="內容版面配置區 2">
+            <a:extLst>
+              <a:ext uri="{FF2B5EF4-FFF2-40B4-BE49-F238E27FC236}">
+                <a16:creationId xmlns:a16="http://schemas.microsoft.com/office/drawing/2014/main" id="{94882C2A-DCA0-4EA1-B023-B9DB578F9E06}"/>
+              </a:ext>
+            </a:extLst>
+          </p:cNvPr>
+          <p:cNvSpPr>
+            <a:spLocks noGrp="1"/>
+          </p:cNvSpPr>
+          <p:nvPr>
+            <p:ph idx="1"/>
+          </p:nvPr>
+        </p:nvSpPr>
+        <p:spPr/>
+        <p:txBody>
+          <a:bodyPr/>
+          <a:lstStyle/>
+          <a:p>
+            <a:r>
+              <a:rPr lang="zh-TW" altLang="en-US" dirty="0"/>
+              <a:t>在達到停損條件後</a:t>
+            </a:r>
+            <a:r>
+              <a:rPr lang="en-US" altLang="zh-TW" dirty="0"/>
+              <a:t>(</a:t>
+            </a:r>
+            <a:r>
+              <a:rPr lang="zh-TW" altLang="en-US" dirty="0"/>
+              <a:t>強制平倉時間</a:t>
+            </a:r>
+            <a:r>
+              <a:rPr lang="en-US" altLang="zh-TW" dirty="0"/>
+              <a:t>)</a:t>
+            </a:r>
+            <a:r>
+              <a:rPr lang="zh-TW" altLang="en-US" dirty="0"/>
+              <a:t>平倉</a:t>
+            </a:r>
+            <a:endParaRPr lang="en-US" altLang="zh-TW" dirty="0"/>
+          </a:p>
+          <a:p>
+            <a:r>
+              <a:rPr lang="zh-TW" altLang="en-US" dirty="0"/>
+              <a:t>強制平倉時間依照</a:t>
+            </a:r>
+            <a:r>
+              <a:rPr lang="en-US" altLang="zh-TW" dirty="0"/>
+              <a:t>JSON</a:t>
+            </a:r>
+            <a:r>
+              <a:rPr lang="zh-TW" altLang="en-US" dirty="0"/>
+              <a:t>檔之</a:t>
+            </a:r>
+            <a:r>
+              <a:rPr lang="en-US" altLang="zh-TW" dirty="0" err="1"/>
+              <a:t>get_cover_time</a:t>
+            </a:r>
+            <a:r>
+              <a:rPr lang="zh-TW" altLang="en-US" dirty="0"/>
+              <a:t>參數</a:t>
+            </a:r>
+            <a:endParaRPr lang="en-US" altLang="zh-TW" dirty="0"/>
+          </a:p>
+          <a:p>
+            <a:pPr lvl="1"/>
+            <a:r>
+              <a:rPr lang="zh-TW" altLang="en-US" dirty="0"/>
+              <a:t>此參數與模擬單之平倉時間共用</a:t>
+            </a:r>
+            <a:endParaRPr lang="en-US" altLang="zh-TW" dirty="0"/>
+          </a:p>
+          <a:p>
+            <a:pPr lvl="1"/>
+            <a:r>
+              <a:rPr lang="zh-TW" altLang="en-US" dirty="0"/>
+              <a:t>需搭配</a:t>
+            </a:r>
+            <a:r>
+              <a:rPr lang="en-US" altLang="zh-TW" dirty="0" err="1"/>
+              <a:t>cover_mode</a:t>
+            </a:r>
+            <a:r>
+              <a:rPr lang="zh-TW" altLang="en-US" dirty="0"/>
+              <a:t>參數</a:t>
+            </a:r>
+            <a:endParaRPr lang="en-US" altLang="zh-TW" dirty="0"/>
+          </a:p>
+          <a:p>
+            <a:r>
+              <a:rPr lang="zh-TW" altLang="en-US" dirty="0"/>
+              <a:t>買價皆會掛在最佳買價第三檔</a:t>
+            </a:r>
+            <a:r>
+              <a:rPr lang="en-US" altLang="zh-TW" dirty="0"/>
+              <a:t>, </a:t>
+            </a:r>
+            <a:r>
+              <a:rPr lang="zh-TW" altLang="en-US" dirty="0"/>
+              <a:t>避免夜盤價差大的風險</a:t>
+            </a:r>
+            <a:endParaRPr lang="en-US" altLang="zh-TW" dirty="0"/>
+          </a:p>
+          <a:p>
+            <a:endParaRPr lang="zh-TW" altLang="en-US" dirty="0"/>
+          </a:p>
+        </p:txBody>
+      </p:sp>
+      <p:sp>
+        <p:nvSpPr>
+          <p:cNvPr id="4" name="標題 1">
+            <a:extLst>
+              <a:ext uri="{FF2B5EF4-FFF2-40B4-BE49-F238E27FC236}">
+                <a16:creationId xmlns:a16="http://schemas.microsoft.com/office/drawing/2014/main" id="{ED242211-A1CD-4589-8C4F-EC7BA8943355}"/>
+              </a:ext>
+            </a:extLst>
+          </p:cNvPr>
+          <p:cNvSpPr txBox="1">
+            <a:spLocks/>
+          </p:cNvSpPr>
+          <p:nvPr/>
+        </p:nvSpPr>
+        <p:spPr>
+          <a:xfrm>
+            <a:off x="0" y="12790"/>
+            <a:ext cx="10515600" cy="1325563"/>
+          </a:xfrm>
+          <a:prstGeom prst="rect">
+            <a:avLst/>
+          </a:prstGeom>
+        </p:spPr>
+        <p:txBody>
+          <a:bodyPr vert="horz" lIns="91440" tIns="45720" rIns="91440" bIns="45720" rtlCol="0" anchor="ctr">
+            <a:normAutofit/>
+          </a:bodyPr>
+          <a:lstStyle>
+            <a:lvl1pPr algn="l" defTabSz="914400" rtl="0" eaLnBrk="1" latinLnBrk="0" hangingPunct="1">
+              <a:lnSpc>
+                <a:spcPct val="90000"/>
+              </a:lnSpc>
+              <a:spcBef>
+                <a:spcPct val="0"/>
+              </a:spcBef>
+              <a:buNone/>
+              <a:defRPr sz="4400" kern="1200">
+                <a:solidFill>
+                  <a:schemeClr val="tx1"/>
+                </a:solidFill>
+                <a:latin typeface="+mj-lt"/>
+                <a:ea typeface="+mj-ea"/>
+                <a:cs typeface="+mj-cs"/>
+              </a:defRPr>
+            </a:lvl1pPr>
+          </a:lstStyle>
+          <a:p>
+            <a:r>
+              <a:rPr lang="zh-TW" altLang="en-US" dirty="0"/>
+              <a:t>實單平倉</a:t>
+            </a:r>
+            <a:endParaRPr lang="en-US" altLang="zh-TW" dirty="0"/>
+          </a:p>
+          <a:p>
+            <a:r>
+              <a:rPr lang="zh-TW" altLang="en-US" sz="2800" dirty="0"/>
+              <a:t>功能一</a:t>
+            </a:r>
+          </a:p>
+        </p:txBody>
+      </p:sp>
+    </p:spTree>
+    <p:extLst>
+      <p:ext uri="{BB962C8B-B14F-4D97-AF65-F5344CB8AC3E}">
+        <p14:creationId xmlns:p14="http://schemas.microsoft.com/office/powerpoint/2010/main" val="810579330"/>
       </p:ext>
     </p:extLst>
   </p:cSld>

</xml_diff>

<commit_message>
Add gap_time ability to cover order, detail explain in txt
</commit_message>
<xml_diff>
--- a/選擇權自動化.pptx
+++ b/選擇權自動化.pptx
@@ -271,7 +271,7 @@
           <a:p>
             <a:fld id="{F08863E2-33C6-4A67-A414-40E7C2332897}" type="datetimeFigureOut">
               <a:rPr lang="zh-TW" altLang="en-US" smtClean="0"/>
-              <a:t>2022/12/11</a:t>
+              <a:t>2023/1/31</a:t>
             </a:fld>
             <a:endParaRPr lang="zh-TW" altLang="en-US"/>
           </a:p>
@@ -469,7 +469,7 @@
           <a:p>
             <a:fld id="{F08863E2-33C6-4A67-A414-40E7C2332897}" type="datetimeFigureOut">
               <a:rPr lang="zh-TW" altLang="en-US" smtClean="0"/>
-              <a:t>2022/12/11</a:t>
+              <a:t>2023/1/31</a:t>
             </a:fld>
             <a:endParaRPr lang="zh-TW" altLang="en-US"/>
           </a:p>
@@ -677,7 +677,7 @@
           <a:p>
             <a:fld id="{F08863E2-33C6-4A67-A414-40E7C2332897}" type="datetimeFigureOut">
               <a:rPr lang="zh-TW" altLang="en-US" smtClean="0"/>
-              <a:t>2022/12/11</a:t>
+              <a:t>2023/1/31</a:t>
             </a:fld>
             <a:endParaRPr lang="zh-TW" altLang="en-US"/>
           </a:p>
@@ -875,7 +875,7 @@
           <a:p>
             <a:fld id="{F08863E2-33C6-4A67-A414-40E7C2332897}" type="datetimeFigureOut">
               <a:rPr lang="zh-TW" altLang="en-US" smtClean="0"/>
-              <a:t>2022/12/11</a:t>
+              <a:t>2023/1/31</a:t>
             </a:fld>
             <a:endParaRPr lang="zh-TW" altLang="en-US"/>
           </a:p>
@@ -1150,7 +1150,7 @@
           <a:p>
             <a:fld id="{F08863E2-33C6-4A67-A414-40E7C2332897}" type="datetimeFigureOut">
               <a:rPr lang="zh-TW" altLang="en-US" smtClean="0"/>
-              <a:t>2022/12/11</a:t>
+              <a:t>2023/1/31</a:t>
             </a:fld>
             <a:endParaRPr lang="zh-TW" altLang="en-US"/>
           </a:p>
@@ -1415,7 +1415,7 @@
           <a:p>
             <a:fld id="{F08863E2-33C6-4A67-A414-40E7C2332897}" type="datetimeFigureOut">
               <a:rPr lang="zh-TW" altLang="en-US" smtClean="0"/>
-              <a:t>2022/12/11</a:t>
+              <a:t>2023/1/31</a:t>
             </a:fld>
             <a:endParaRPr lang="zh-TW" altLang="en-US"/>
           </a:p>
@@ -1827,7 +1827,7 @@
           <a:p>
             <a:fld id="{F08863E2-33C6-4A67-A414-40E7C2332897}" type="datetimeFigureOut">
               <a:rPr lang="zh-TW" altLang="en-US" smtClean="0"/>
-              <a:t>2022/12/11</a:t>
+              <a:t>2023/1/31</a:t>
             </a:fld>
             <a:endParaRPr lang="zh-TW" altLang="en-US"/>
           </a:p>
@@ -1968,7 +1968,7 @@
           <a:p>
             <a:fld id="{F08863E2-33C6-4A67-A414-40E7C2332897}" type="datetimeFigureOut">
               <a:rPr lang="zh-TW" altLang="en-US" smtClean="0"/>
-              <a:t>2022/12/11</a:t>
+              <a:t>2023/1/31</a:t>
             </a:fld>
             <a:endParaRPr lang="zh-TW" altLang="en-US"/>
           </a:p>
@@ -2081,7 +2081,7 @@
           <a:p>
             <a:fld id="{F08863E2-33C6-4A67-A414-40E7C2332897}" type="datetimeFigureOut">
               <a:rPr lang="zh-TW" altLang="en-US" smtClean="0"/>
-              <a:t>2022/12/11</a:t>
+              <a:t>2023/1/31</a:t>
             </a:fld>
             <a:endParaRPr lang="zh-TW" altLang="en-US"/>
           </a:p>
@@ -2392,7 +2392,7 @@
           <a:p>
             <a:fld id="{F08863E2-33C6-4A67-A414-40E7C2332897}" type="datetimeFigureOut">
               <a:rPr lang="zh-TW" altLang="en-US" smtClean="0"/>
-              <a:t>2022/12/11</a:t>
+              <a:t>2023/1/31</a:t>
             </a:fld>
             <a:endParaRPr lang="zh-TW" altLang="en-US"/>
           </a:p>
@@ -2680,7 +2680,7 @@
           <a:p>
             <a:fld id="{F08863E2-33C6-4A67-A414-40E7C2332897}" type="datetimeFigureOut">
               <a:rPr lang="zh-TW" altLang="en-US" smtClean="0"/>
-              <a:t>2022/12/11</a:t>
+              <a:t>2023/1/31</a:t>
             </a:fld>
             <a:endParaRPr lang="zh-TW" altLang="en-US"/>
           </a:p>
@@ -2921,7 +2921,7 @@
           <a:p>
             <a:fld id="{F08863E2-33C6-4A67-A414-40E7C2332897}" type="datetimeFigureOut">
               <a:rPr lang="zh-TW" altLang="en-US" smtClean="0"/>
-              <a:t>2022/12/11</a:t>
+              <a:t>2023/1/31</a:t>
             </a:fld>
             <a:endParaRPr lang="zh-TW" altLang="en-US"/>
           </a:p>

</xml_diff>

<commit_message>
Add daily limit sell call order ability
</commit_message>
<xml_diff>
--- a/選擇權自動化.pptx
+++ b/選擇權自動化.pptx
@@ -16,8 +16,10 @@
     <p:sldId id="262" r:id="rId10"/>
     <p:sldId id="266" r:id="rId11"/>
     <p:sldId id="269" r:id="rId12"/>
-    <p:sldId id="267" r:id="rId13"/>
-    <p:sldId id="268" r:id="rId14"/>
+    <p:sldId id="270" r:id="rId13"/>
+    <p:sldId id="271" r:id="rId14"/>
+    <p:sldId id="267" r:id="rId15"/>
+    <p:sldId id="268" r:id="rId16"/>
   </p:sldIdLst>
   <p:sldSz cx="12192000" cy="6858000"/>
   <p:notesSz cx="6858000" cy="9144000"/>
@@ -271,7 +273,7 @@
           <a:p>
             <a:fld id="{F08863E2-33C6-4A67-A414-40E7C2332897}" type="datetimeFigureOut">
               <a:rPr lang="zh-TW" altLang="en-US" smtClean="0"/>
-              <a:t>2023/1/31</a:t>
+              <a:t>2023/3/8</a:t>
             </a:fld>
             <a:endParaRPr lang="zh-TW" altLang="en-US"/>
           </a:p>
@@ -469,7 +471,7 @@
           <a:p>
             <a:fld id="{F08863E2-33C6-4A67-A414-40E7C2332897}" type="datetimeFigureOut">
               <a:rPr lang="zh-TW" altLang="en-US" smtClean="0"/>
-              <a:t>2023/1/31</a:t>
+              <a:t>2023/3/8</a:t>
             </a:fld>
             <a:endParaRPr lang="zh-TW" altLang="en-US"/>
           </a:p>
@@ -677,7 +679,7 @@
           <a:p>
             <a:fld id="{F08863E2-33C6-4A67-A414-40E7C2332897}" type="datetimeFigureOut">
               <a:rPr lang="zh-TW" altLang="en-US" smtClean="0"/>
-              <a:t>2023/1/31</a:t>
+              <a:t>2023/3/8</a:t>
             </a:fld>
             <a:endParaRPr lang="zh-TW" altLang="en-US"/>
           </a:p>
@@ -875,7 +877,7 @@
           <a:p>
             <a:fld id="{F08863E2-33C6-4A67-A414-40E7C2332897}" type="datetimeFigureOut">
               <a:rPr lang="zh-TW" altLang="en-US" smtClean="0"/>
-              <a:t>2023/1/31</a:t>
+              <a:t>2023/3/8</a:t>
             </a:fld>
             <a:endParaRPr lang="zh-TW" altLang="en-US"/>
           </a:p>
@@ -1150,7 +1152,7 @@
           <a:p>
             <a:fld id="{F08863E2-33C6-4A67-A414-40E7C2332897}" type="datetimeFigureOut">
               <a:rPr lang="zh-TW" altLang="en-US" smtClean="0"/>
-              <a:t>2023/1/31</a:t>
+              <a:t>2023/3/8</a:t>
             </a:fld>
             <a:endParaRPr lang="zh-TW" altLang="en-US"/>
           </a:p>
@@ -1415,7 +1417,7 @@
           <a:p>
             <a:fld id="{F08863E2-33C6-4A67-A414-40E7C2332897}" type="datetimeFigureOut">
               <a:rPr lang="zh-TW" altLang="en-US" smtClean="0"/>
-              <a:t>2023/1/31</a:t>
+              <a:t>2023/3/8</a:t>
             </a:fld>
             <a:endParaRPr lang="zh-TW" altLang="en-US"/>
           </a:p>
@@ -1827,7 +1829,7 @@
           <a:p>
             <a:fld id="{F08863E2-33C6-4A67-A414-40E7C2332897}" type="datetimeFigureOut">
               <a:rPr lang="zh-TW" altLang="en-US" smtClean="0"/>
-              <a:t>2023/1/31</a:t>
+              <a:t>2023/3/8</a:t>
             </a:fld>
             <a:endParaRPr lang="zh-TW" altLang="en-US"/>
           </a:p>
@@ -1968,7 +1970,7 @@
           <a:p>
             <a:fld id="{F08863E2-33C6-4A67-A414-40E7C2332897}" type="datetimeFigureOut">
               <a:rPr lang="zh-TW" altLang="en-US" smtClean="0"/>
-              <a:t>2023/1/31</a:t>
+              <a:t>2023/3/8</a:t>
             </a:fld>
             <a:endParaRPr lang="zh-TW" altLang="en-US"/>
           </a:p>
@@ -2081,7 +2083,7 @@
           <a:p>
             <a:fld id="{F08863E2-33C6-4A67-A414-40E7C2332897}" type="datetimeFigureOut">
               <a:rPr lang="zh-TW" altLang="en-US" smtClean="0"/>
-              <a:t>2023/1/31</a:t>
+              <a:t>2023/3/8</a:t>
             </a:fld>
             <a:endParaRPr lang="zh-TW" altLang="en-US"/>
           </a:p>
@@ -2392,7 +2394,7 @@
           <a:p>
             <a:fld id="{F08863E2-33C6-4A67-A414-40E7C2332897}" type="datetimeFigureOut">
               <a:rPr lang="zh-TW" altLang="en-US" smtClean="0"/>
-              <a:t>2023/1/31</a:t>
+              <a:t>2023/3/8</a:t>
             </a:fld>
             <a:endParaRPr lang="zh-TW" altLang="en-US"/>
           </a:p>
@@ -2680,7 +2682,7 @@
           <a:p>
             <a:fld id="{F08863E2-33C6-4A67-A414-40E7C2332897}" type="datetimeFigureOut">
               <a:rPr lang="zh-TW" altLang="en-US" smtClean="0"/>
-              <a:t>2023/1/31</a:t>
+              <a:t>2023/3/8</a:t>
             </a:fld>
             <a:endParaRPr lang="zh-TW" altLang="en-US"/>
           </a:p>
@@ -2921,7 +2923,7 @@
           <a:p>
             <a:fld id="{F08863E2-33C6-4A67-A414-40E7C2332897}" type="datetimeFigureOut">
               <a:rPr lang="zh-TW" altLang="en-US" smtClean="0"/>
-              <a:t>2023/1/31</a:t>
+              <a:t>2023/3/8</a:t>
             </a:fld>
             <a:endParaRPr lang="zh-TW" altLang="en-US"/>
           </a:p>
@@ -3786,6 +3788,387 @@
           <p:cNvPr id="2" name="標題 1">
             <a:extLst>
               <a:ext uri="{FF2B5EF4-FFF2-40B4-BE49-F238E27FC236}">
+                <a16:creationId xmlns:a16="http://schemas.microsoft.com/office/drawing/2014/main" id="{763E0317-C59F-429F-8A1C-CFE0EAEC5D09}"/>
+              </a:ext>
+            </a:extLst>
+          </p:cNvPr>
+          <p:cNvSpPr>
+            <a:spLocks noGrp="1"/>
+          </p:cNvSpPr>
+          <p:nvPr>
+            <p:ph type="title"/>
+          </p:nvPr>
+        </p:nvSpPr>
+        <p:spPr/>
+        <p:txBody>
+          <a:bodyPr/>
+          <a:lstStyle/>
+          <a:p>
+            <a:r>
+              <a:rPr lang="zh-TW" altLang="en-US" dirty="0"/>
+              <a:t>實單預掛</a:t>
+            </a:r>
+            <a:r>
+              <a:rPr lang="en-US" altLang="zh-TW" dirty="0"/>
+              <a:t>Sell Call</a:t>
+            </a:r>
+            <a:r>
+              <a:rPr lang="zh-TW" altLang="en-US" dirty="0"/>
+              <a:t>漲停單</a:t>
+            </a:r>
+          </a:p>
+        </p:txBody>
+      </p:sp>
+      <p:sp>
+        <p:nvSpPr>
+          <p:cNvPr id="3" name="內容版面配置區 2">
+            <a:extLst>
+              <a:ext uri="{FF2B5EF4-FFF2-40B4-BE49-F238E27FC236}">
+                <a16:creationId xmlns:a16="http://schemas.microsoft.com/office/drawing/2014/main" id="{99C58024-C95E-4E4F-9097-63791D77E1F1}"/>
+              </a:ext>
+            </a:extLst>
+          </p:cNvPr>
+          <p:cNvSpPr>
+            <a:spLocks noGrp="1"/>
+          </p:cNvSpPr>
+          <p:nvPr>
+            <p:ph idx="1"/>
+          </p:nvPr>
+        </p:nvSpPr>
+        <p:spPr/>
+        <p:txBody>
+          <a:bodyPr/>
+          <a:lstStyle/>
+          <a:p>
+            <a:r>
+              <a:rPr lang="zh-TW" altLang="en-US" dirty="0"/>
+              <a:t>每日開盤前，掛最接近台灣指數收盤的履約價</a:t>
+            </a:r>
+            <a:r>
+              <a:rPr lang="en-US" altLang="zh-TW" dirty="0"/>
+              <a:t>N</a:t>
+            </a:r>
+            <a:r>
+              <a:rPr lang="zh-TW" altLang="en-US" dirty="0"/>
+              <a:t>口</a:t>
+            </a:r>
+            <a:r>
+              <a:rPr lang="en-US" altLang="zh-TW" dirty="0"/>
+              <a:t>sell call</a:t>
+            </a:r>
+            <a:r>
+              <a:rPr lang="zh-TW" altLang="en-US" dirty="0"/>
+              <a:t>漲停價</a:t>
+            </a:r>
+            <a:endParaRPr lang="en-US" altLang="zh-TW" dirty="0"/>
+          </a:p>
+          <a:p>
+            <a:pPr lvl="1"/>
+            <a:r>
+              <a:rPr lang="en-US" altLang="zh-TW" dirty="0"/>
+              <a:t>N</a:t>
+            </a:r>
+            <a:r>
+              <a:rPr lang="zh-TW" altLang="en-US" dirty="0"/>
+              <a:t>由</a:t>
+            </a:r>
+            <a:r>
+              <a:rPr lang="en-US" altLang="zh-TW" dirty="0" err="1"/>
+              <a:t>globals.sell_call_quatity</a:t>
+            </a:r>
+            <a:r>
+              <a:rPr lang="zh-TW" altLang="en-US" dirty="0"/>
+              <a:t>決定</a:t>
+            </a:r>
+          </a:p>
+          <a:p>
+            <a:endParaRPr lang="zh-TW" altLang="en-US" dirty="0"/>
+          </a:p>
+          <a:p>
+            <a:r>
+              <a:rPr lang="zh-TW" altLang="en-US" dirty="0"/>
+              <a:t>漲停價說明</a:t>
+            </a:r>
+            <a:r>
+              <a:rPr lang="en-US" altLang="zh-TW" dirty="0"/>
+              <a:t>1: </a:t>
+            </a:r>
+            <a:r>
+              <a:rPr lang="zh-TW" altLang="en-US" dirty="0"/>
+              <a:t>假設昨日收盤</a:t>
+            </a:r>
+            <a:r>
+              <a:rPr lang="en-US" altLang="zh-TW" dirty="0"/>
+              <a:t>15000</a:t>
+            </a:r>
+            <a:r>
+              <a:rPr lang="zh-TW" altLang="en-US" dirty="0"/>
+              <a:t>，則今天掛</a:t>
+            </a:r>
+            <a:r>
+              <a:rPr lang="en-US" altLang="zh-TW" dirty="0"/>
+              <a:t>sell call 15000 </a:t>
+            </a:r>
+            <a:r>
+              <a:rPr lang="zh-TW" altLang="en-US" dirty="0"/>
+              <a:t>價格在</a:t>
+            </a:r>
+            <a:r>
+              <a:rPr lang="en-US" altLang="zh-TW" dirty="0"/>
+              <a:t>15000*10% = 1500</a:t>
+            </a:r>
+            <a:r>
+              <a:rPr lang="zh-TW" altLang="en-US" dirty="0"/>
+              <a:t>上</a:t>
+            </a:r>
+            <a:endParaRPr lang="en-US" altLang="zh-TW" dirty="0"/>
+          </a:p>
+          <a:p>
+            <a:r>
+              <a:rPr lang="zh-TW" altLang="en-US" dirty="0"/>
+              <a:t>漲停價說明</a:t>
+            </a:r>
+            <a:r>
+              <a:rPr lang="en-US" altLang="zh-TW" dirty="0"/>
+              <a:t>2: </a:t>
+            </a:r>
+            <a:r>
+              <a:rPr lang="zh-TW" altLang="en-US" dirty="0"/>
+              <a:t>假設昨日收盤</a:t>
+            </a:r>
+            <a:r>
+              <a:rPr lang="en-US" altLang="zh-TW" dirty="0"/>
+              <a:t>16668</a:t>
+            </a:r>
+            <a:r>
+              <a:rPr lang="zh-TW" altLang="en-US" dirty="0"/>
+              <a:t>，則今天掛</a:t>
+            </a:r>
+            <a:r>
+              <a:rPr lang="en-US" altLang="zh-TW" dirty="0"/>
+              <a:t>sell call 16650 </a:t>
+            </a:r>
+            <a:r>
+              <a:rPr lang="zh-TW" altLang="en-US" dirty="0"/>
+              <a:t>價格在</a:t>
+            </a:r>
+            <a:r>
+              <a:rPr lang="en-US" altLang="zh-TW" dirty="0"/>
+              <a:t>16650*10% = 1665</a:t>
+            </a:r>
+            <a:r>
+              <a:rPr lang="zh-TW" altLang="en-US" dirty="0"/>
+              <a:t>上</a:t>
+            </a:r>
+          </a:p>
+          <a:p>
+            <a:endParaRPr lang="zh-TW" altLang="en-US" dirty="0"/>
+          </a:p>
+        </p:txBody>
+      </p:sp>
+    </p:spTree>
+    <p:extLst>
+      <p:ext uri="{BB962C8B-B14F-4D97-AF65-F5344CB8AC3E}">
+        <p14:creationId xmlns:p14="http://schemas.microsoft.com/office/powerpoint/2010/main" val="2010119645"/>
+      </p:ext>
+    </p:extLst>
+  </p:cSld>
+  <p:clrMapOvr>
+    <a:masterClrMapping/>
+  </p:clrMapOvr>
+</p:sld>
+</file>
+
+<file path=ppt/slides/slide13.xml><?xml version="1.0" encoding="utf-8"?>
+<p:sld xmlns:a="http://schemas.openxmlformats.org/drawingml/2006/main" xmlns:r="http://schemas.openxmlformats.org/officeDocument/2006/relationships" xmlns:p="http://schemas.openxmlformats.org/presentationml/2006/main">
+  <p:cSld>
+    <p:spTree>
+      <p:nvGrpSpPr>
+        <p:cNvPr id="1" name=""/>
+        <p:cNvGrpSpPr/>
+        <p:nvPr/>
+      </p:nvGrpSpPr>
+      <p:grpSpPr>
+        <a:xfrm>
+          <a:off x="0" y="0"/>
+          <a:ext cx="0" cy="0"/>
+          <a:chOff x="0" y="0"/>
+          <a:chExt cx="0" cy="0"/>
+        </a:xfrm>
+      </p:grpSpPr>
+      <p:sp>
+        <p:nvSpPr>
+          <p:cNvPr id="2" name="標題 1">
+            <a:extLst>
+              <a:ext uri="{FF2B5EF4-FFF2-40B4-BE49-F238E27FC236}">
+                <a16:creationId xmlns:a16="http://schemas.microsoft.com/office/drawing/2014/main" id="{D30B6F10-B981-4C5C-A863-123C980CB0C7}"/>
+              </a:ext>
+            </a:extLst>
+          </p:cNvPr>
+          <p:cNvSpPr>
+            <a:spLocks noGrp="1"/>
+          </p:cNvSpPr>
+          <p:nvPr>
+            <p:ph type="title"/>
+          </p:nvPr>
+        </p:nvSpPr>
+        <p:spPr/>
+        <p:txBody>
+          <a:bodyPr>
+            <a:normAutofit/>
+          </a:bodyPr>
+          <a:lstStyle/>
+          <a:p>
+            <a:r>
+              <a:rPr lang="zh-TW" altLang="en-US" dirty="0"/>
+              <a:t>實單成功畫面</a:t>
+            </a:r>
+            <a:br>
+              <a:rPr lang="zh-TW" altLang="en-US" dirty="0"/>
+            </a:br>
+            <a:endParaRPr lang="zh-TW" altLang="en-US" dirty="0"/>
+          </a:p>
+        </p:txBody>
+      </p:sp>
+      <p:sp>
+        <p:nvSpPr>
+          <p:cNvPr id="3" name="內容版面配置區 2">
+            <a:extLst>
+              <a:ext uri="{FF2B5EF4-FFF2-40B4-BE49-F238E27FC236}">
+                <a16:creationId xmlns:a16="http://schemas.microsoft.com/office/drawing/2014/main" id="{C5F39A6F-8DB5-4E3C-9C2E-8F1526792048}"/>
+              </a:ext>
+            </a:extLst>
+          </p:cNvPr>
+          <p:cNvSpPr>
+            <a:spLocks noGrp="1"/>
+          </p:cNvSpPr>
+          <p:nvPr>
+            <p:ph idx="1"/>
+          </p:nvPr>
+        </p:nvSpPr>
+        <p:spPr/>
+        <p:txBody>
+          <a:bodyPr/>
+          <a:lstStyle/>
+          <a:p>
+            <a:r>
+              <a:rPr lang="zh-TW" altLang="en-US" dirty="0"/>
+              <a:t>左邊</a:t>
+            </a:r>
+            <a:r>
+              <a:rPr lang="en-US" altLang="zh-TW" dirty="0"/>
+              <a:t>log </a:t>
+            </a:r>
+            <a:r>
+              <a:rPr lang="zh-TW" altLang="en-US" dirty="0"/>
+              <a:t>右邊為永豐</a:t>
+            </a:r>
+            <a:r>
+              <a:rPr lang="en-US" altLang="zh-TW" dirty="0"/>
+              <a:t>APP</a:t>
+            </a:r>
+            <a:r>
+              <a:rPr lang="zh-TW" altLang="en-US" dirty="0"/>
+              <a:t>交易紀錄</a:t>
+            </a:r>
+          </a:p>
+        </p:txBody>
+      </p:sp>
+      <p:pic>
+        <p:nvPicPr>
+          <p:cNvPr id="6" name="圖片 5">
+            <a:extLst>
+              <a:ext uri="{FF2B5EF4-FFF2-40B4-BE49-F238E27FC236}">
+                <a16:creationId xmlns:a16="http://schemas.microsoft.com/office/drawing/2014/main" id="{3CE0087C-B550-4235-A9FB-6FB0836160ED}"/>
+              </a:ext>
+            </a:extLst>
+          </p:cNvPr>
+          <p:cNvPicPr>
+            <a:picLocks noChangeAspect="1"/>
+          </p:cNvPicPr>
+          <p:nvPr/>
+        </p:nvPicPr>
+        <p:blipFill>
+          <a:blip r:embed="rId2"/>
+          <a:stretch>
+            <a:fillRect/>
+          </a:stretch>
+        </p:blipFill>
+        <p:spPr>
+          <a:xfrm>
+            <a:off x="0" y="6504490"/>
+            <a:ext cx="12192000" cy="353510"/>
+          </a:xfrm>
+          <a:prstGeom prst="rect">
+            <a:avLst/>
+          </a:prstGeom>
+        </p:spPr>
+      </p:pic>
+      <p:pic>
+        <p:nvPicPr>
+          <p:cNvPr id="7" name="圖片 6">
+            <a:extLst>
+              <a:ext uri="{FF2B5EF4-FFF2-40B4-BE49-F238E27FC236}">
+                <a16:creationId xmlns:a16="http://schemas.microsoft.com/office/drawing/2014/main" id="{80BC9C63-CB30-43FC-B2D1-0C9538A5F2BA}"/>
+              </a:ext>
+            </a:extLst>
+          </p:cNvPr>
+          <p:cNvPicPr>
+            <a:picLocks noChangeAspect="1"/>
+          </p:cNvPicPr>
+          <p:nvPr/>
+        </p:nvPicPr>
+        <p:blipFill>
+          <a:blip r:embed="rId3"/>
+          <a:stretch>
+            <a:fillRect/>
+          </a:stretch>
+        </p:blipFill>
+        <p:spPr>
+          <a:xfrm>
+            <a:off x="9023407" y="0"/>
+            <a:ext cx="3168593" cy="6504490"/>
+          </a:xfrm>
+          <a:prstGeom prst="rect">
+            <a:avLst/>
+          </a:prstGeom>
+        </p:spPr>
+      </p:pic>
+    </p:spTree>
+    <p:extLst>
+      <p:ext uri="{BB962C8B-B14F-4D97-AF65-F5344CB8AC3E}">
+        <p14:creationId xmlns:p14="http://schemas.microsoft.com/office/powerpoint/2010/main" val="1131451205"/>
+      </p:ext>
+    </p:extLst>
+  </p:cSld>
+  <p:clrMapOvr>
+    <a:masterClrMapping/>
+  </p:clrMapOvr>
+</p:sld>
+</file>
+
+<file path=ppt/slides/slide14.xml><?xml version="1.0" encoding="utf-8"?>
+<p:sld xmlns:a="http://schemas.openxmlformats.org/drawingml/2006/main" xmlns:r="http://schemas.openxmlformats.org/officeDocument/2006/relationships" xmlns:p="http://schemas.openxmlformats.org/presentationml/2006/main">
+  <p:cSld>
+    <p:spTree>
+      <p:nvGrpSpPr>
+        <p:cNvPr id="1" name=""/>
+        <p:cNvGrpSpPr/>
+        <p:nvPr/>
+      </p:nvGrpSpPr>
+      <p:grpSpPr>
+        <a:xfrm>
+          <a:off x="0" y="0"/>
+          <a:ext cx="0" cy="0"/>
+          <a:chOff x="0" y="0"/>
+          <a:chExt cx="0" cy="0"/>
+        </a:xfrm>
+      </p:grpSpPr>
+      <p:sp>
+        <p:nvSpPr>
+          <p:cNvPr id="2" name="標題 1">
+            <a:extLst>
+              <a:ext uri="{FF2B5EF4-FFF2-40B4-BE49-F238E27FC236}">
                 <a16:creationId xmlns:a16="http://schemas.microsoft.com/office/drawing/2014/main" id="{7900AE8C-B885-412B-A332-1D7059AEE3A8}"/>
               </a:ext>
             </a:extLst>
@@ -3946,7 +4329,7 @@
 </p:sld>
 </file>
 
-<file path=ppt/slides/slide13.xml><?xml version="1.0" encoding="utf-8"?>
+<file path=ppt/slides/slide15.xml><?xml version="1.0" encoding="utf-8"?>
 <p:sld xmlns:a="http://schemas.openxmlformats.org/drawingml/2006/main" xmlns:r="http://schemas.openxmlformats.org/officeDocument/2006/relationships" xmlns:p="http://schemas.openxmlformats.org/presentationml/2006/main">
   <p:cSld>
     <p:spTree>

</xml_diff>

<commit_message>
Add new ability's explain in PPT
</commit_message>
<xml_diff>
--- a/選擇權自動化.pptx
+++ b/選擇權自動化.pptx
@@ -17,9 +17,10 @@
     <p:sldId id="266" r:id="rId11"/>
     <p:sldId id="269" r:id="rId12"/>
     <p:sldId id="270" r:id="rId13"/>
-    <p:sldId id="271" r:id="rId14"/>
-    <p:sldId id="267" r:id="rId15"/>
-    <p:sldId id="268" r:id="rId16"/>
+    <p:sldId id="272" r:id="rId14"/>
+    <p:sldId id="271" r:id="rId15"/>
+    <p:sldId id="267" r:id="rId16"/>
+    <p:sldId id="268" r:id="rId17"/>
   </p:sldIdLst>
   <p:sldSz cx="12192000" cy="6858000"/>
   <p:notesSz cx="6858000" cy="9144000"/>
@@ -273,7 +274,7 @@
           <a:p>
             <a:fld id="{F08863E2-33C6-4A67-A414-40E7C2332897}" type="datetimeFigureOut">
               <a:rPr lang="zh-TW" altLang="en-US" smtClean="0"/>
-              <a:t>2023/3/9</a:t>
+              <a:t>2023/5/2</a:t>
             </a:fld>
             <a:endParaRPr lang="zh-TW" altLang="en-US"/>
           </a:p>
@@ -471,7 +472,7 @@
           <a:p>
             <a:fld id="{F08863E2-33C6-4A67-A414-40E7C2332897}" type="datetimeFigureOut">
               <a:rPr lang="zh-TW" altLang="en-US" smtClean="0"/>
-              <a:t>2023/3/9</a:t>
+              <a:t>2023/5/2</a:t>
             </a:fld>
             <a:endParaRPr lang="zh-TW" altLang="en-US"/>
           </a:p>
@@ -679,7 +680,7 @@
           <a:p>
             <a:fld id="{F08863E2-33C6-4A67-A414-40E7C2332897}" type="datetimeFigureOut">
               <a:rPr lang="zh-TW" altLang="en-US" smtClean="0"/>
-              <a:t>2023/3/9</a:t>
+              <a:t>2023/5/2</a:t>
             </a:fld>
             <a:endParaRPr lang="zh-TW" altLang="en-US"/>
           </a:p>
@@ -877,7 +878,7 @@
           <a:p>
             <a:fld id="{F08863E2-33C6-4A67-A414-40E7C2332897}" type="datetimeFigureOut">
               <a:rPr lang="zh-TW" altLang="en-US" smtClean="0"/>
-              <a:t>2023/3/9</a:t>
+              <a:t>2023/5/2</a:t>
             </a:fld>
             <a:endParaRPr lang="zh-TW" altLang="en-US"/>
           </a:p>
@@ -1152,7 +1153,7 @@
           <a:p>
             <a:fld id="{F08863E2-33C6-4A67-A414-40E7C2332897}" type="datetimeFigureOut">
               <a:rPr lang="zh-TW" altLang="en-US" smtClean="0"/>
-              <a:t>2023/3/9</a:t>
+              <a:t>2023/5/2</a:t>
             </a:fld>
             <a:endParaRPr lang="zh-TW" altLang="en-US"/>
           </a:p>
@@ -1417,7 +1418,7 @@
           <a:p>
             <a:fld id="{F08863E2-33C6-4A67-A414-40E7C2332897}" type="datetimeFigureOut">
               <a:rPr lang="zh-TW" altLang="en-US" smtClean="0"/>
-              <a:t>2023/3/9</a:t>
+              <a:t>2023/5/2</a:t>
             </a:fld>
             <a:endParaRPr lang="zh-TW" altLang="en-US"/>
           </a:p>
@@ -1829,7 +1830,7 @@
           <a:p>
             <a:fld id="{F08863E2-33C6-4A67-A414-40E7C2332897}" type="datetimeFigureOut">
               <a:rPr lang="zh-TW" altLang="en-US" smtClean="0"/>
-              <a:t>2023/3/9</a:t>
+              <a:t>2023/5/2</a:t>
             </a:fld>
             <a:endParaRPr lang="zh-TW" altLang="en-US"/>
           </a:p>
@@ -1970,7 +1971,7 @@
           <a:p>
             <a:fld id="{F08863E2-33C6-4A67-A414-40E7C2332897}" type="datetimeFigureOut">
               <a:rPr lang="zh-TW" altLang="en-US" smtClean="0"/>
-              <a:t>2023/3/9</a:t>
+              <a:t>2023/5/2</a:t>
             </a:fld>
             <a:endParaRPr lang="zh-TW" altLang="en-US"/>
           </a:p>
@@ -2083,7 +2084,7 @@
           <a:p>
             <a:fld id="{F08863E2-33C6-4A67-A414-40E7C2332897}" type="datetimeFigureOut">
               <a:rPr lang="zh-TW" altLang="en-US" smtClean="0"/>
-              <a:t>2023/3/9</a:t>
+              <a:t>2023/5/2</a:t>
             </a:fld>
             <a:endParaRPr lang="zh-TW" altLang="en-US"/>
           </a:p>
@@ -2394,7 +2395,7 @@
           <a:p>
             <a:fld id="{F08863E2-33C6-4A67-A414-40E7C2332897}" type="datetimeFigureOut">
               <a:rPr lang="zh-TW" altLang="en-US" smtClean="0"/>
-              <a:t>2023/3/9</a:t>
+              <a:t>2023/5/2</a:t>
             </a:fld>
             <a:endParaRPr lang="zh-TW" altLang="en-US"/>
           </a:p>
@@ -2682,7 +2683,7 @@
           <a:p>
             <a:fld id="{F08863E2-33C6-4A67-A414-40E7C2332897}" type="datetimeFigureOut">
               <a:rPr lang="zh-TW" altLang="en-US" smtClean="0"/>
-              <a:t>2023/3/9</a:t>
+              <a:t>2023/5/2</a:t>
             </a:fld>
             <a:endParaRPr lang="zh-TW" altLang="en-US"/>
           </a:p>
@@ -2923,7 +2924,7 @@
           <a:p>
             <a:fld id="{F08863E2-33C6-4A67-A414-40E7C2332897}" type="datetimeFigureOut">
               <a:rPr lang="zh-TW" altLang="en-US" smtClean="0"/>
-              <a:t>2023/3/9</a:t>
+              <a:t>2023/5/2</a:t>
             </a:fld>
             <a:endParaRPr lang="zh-TW" altLang="en-US"/>
           </a:p>
@@ -3842,7 +3843,7 @@
           <a:p>
             <a:r>
               <a:rPr lang="zh-TW" altLang="en-US" dirty="0"/>
-              <a:t>每日開盤前，掛最接近台灣指數收盤的履約價</a:t>
+              <a:t>每日開盤前，掛最接近台灣指數收盤的履約價，也就是平盤價上，</a:t>
             </a:r>
             <a:r>
               <a:rPr lang="en-US" altLang="zh-TW" dirty="0"/>
@@ -3858,7 +3859,7 @@
             </a:r>
             <a:r>
               <a:rPr lang="zh-TW" altLang="en-US" dirty="0"/>
-              <a:t>漲停價</a:t>
+              <a:t>的漲停價</a:t>
             </a:r>
             <a:endParaRPr lang="en-US" altLang="zh-TW" dirty="0"/>
           </a:p>
@@ -3973,10 +3974,9 @@
               <a:t>1660</a:t>
             </a:r>
             <a:r>
-              <a:rPr lang="zh-TW" altLang="en-US"/>
+              <a:rPr lang="zh-TW" altLang="en-US" dirty="0"/>
               <a:t>上</a:t>
             </a:r>
-            <a:endParaRPr lang="zh-TW" altLang="en-US" dirty="0"/>
           </a:p>
           <a:p>
             <a:endParaRPr lang="zh-TW" altLang="en-US" dirty="0"/>
@@ -3997,6 +3997,227 @@
 </file>
 
 <file path=ppt/slides/slide13.xml><?xml version="1.0" encoding="utf-8"?>
+<p:sld xmlns:a="http://schemas.openxmlformats.org/drawingml/2006/main" xmlns:r="http://schemas.openxmlformats.org/officeDocument/2006/relationships" xmlns:p="http://schemas.openxmlformats.org/presentationml/2006/main">
+  <p:cSld>
+    <p:spTree>
+      <p:nvGrpSpPr>
+        <p:cNvPr id="1" name=""/>
+        <p:cNvGrpSpPr/>
+        <p:nvPr/>
+      </p:nvGrpSpPr>
+      <p:grpSpPr>
+        <a:xfrm>
+          <a:off x="0" y="0"/>
+          <a:ext cx="0" cy="0"/>
+          <a:chOff x="0" y="0"/>
+          <a:chExt cx="0" cy="0"/>
+        </a:xfrm>
+      </p:grpSpPr>
+      <p:sp>
+        <p:nvSpPr>
+          <p:cNvPr id="2" name="標題 1">
+            <a:extLst>
+              <a:ext uri="{FF2B5EF4-FFF2-40B4-BE49-F238E27FC236}">
+                <a16:creationId xmlns:a16="http://schemas.microsoft.com/office/drawing/2014/main" id="{763E0317-C59F-429F-8A1C-CFE0EAEC5D09}"/>
+              </a:ext>
+            </a:extLst>
+          </p:cNvPr>
+          <p:cNvSpPr>
+            <a:spLocks noGrp="1"/>
+          </p:cNvSpPr>
+          <p:nvPr>
+            <p:ph type="title"/>
+          </p:nvPr>
+        </p:nvSpPr>
+        <p:spPr/>
+        <p:txBody>
+          <a:bodyPr/>
+          <a:lstStyle/>
+          <a:p>
+            <a:r>
+              <a:rPr lang="zh-TW" altLang="en-US" dirty="0"/>
+              <a:t>實單預掛</a:t>
+            </a:r>
+            <a:r>
+              <a:rPr lang="en-US" altLang="zh-TW" dirty="0"/>
+              <a:t>Buy Call</a:t>
+            </a:r>
+            <a:r>
+              <a:rPr lang="zh-TW" altLang="en-US" dirty="0"/>
+              <a:t>跌停單</a:t>
+            </a:r>
+          </a:p>
+        </p:txBody>
+      </p:sp>
+      <p:sp>
+        <p:nvSpPr>
+          <p:cNvPr id="3" name="內容版面配置區 2">
+            <a:extLst>
+              <a:ext uri="{FF2B5EF4-FFF2-40B4-BE49-F238E27FC236}">
+                <a16:creationId xmlns:a16="http://schemas.microsoft.com/office/drawing/2014/main" id="{99C58024-C95E-4E4F-9097-63791D77E1F1}"/>
+              </a:ext>
+            </a:extLst>
+          </p:cNvPr>
+          <p:cNvSpPr>
+            <a:spLocks noGrp="1"/>
+          </p:cNvSpPr>
+          <p:nvPr>
+            <p:ph idx="1"/>
+          </p:nvPr>
+        </p:nvSpPr>
+        <p:spPr/>
+        <p:txBody>
+          <a:bodyPr/>
+          <a:lstStyle/>
+          <a:p>
+            <a:r>
+              <a:rPr lang="zh-TW" altLang="en-US" dirty="0"/>
+              <a:t>每日開盤前，掛昨日收盤的跌停履約價，也就是昨日收</a:t>
+            </a:r>
+            <a:r>
+              <a:rPr lang="en-US" altLang="zh-TW" dirty="0"/>
+              <a:t>-</a:t>
+            </a:r>
+            <a:r>
+              <a:rPr lang="zh-TW" altLang="en-US" dirty="0"/>
+              <a:t>昨日收*</a:t>
+            </a:r>
+            <a:r>
+              <a:rPr lang="en-US" altLang="zh-TW" dirty="0"/>
+              <a:t>10%</a:t>
+            </a:r>
+            <a:r>
+              <a:rPr lang="zh-TW" altLang="en-US" dirty="0"/>
+              <a:t>，</a:t>
+            </a:r>
+            <a:r>
+              <a:rPr lang="en-US" altLang="zh-TW" dirty="0"/>
+              <a:t>N</a:t>
+            </a:r>
+            <a:r>
+              <a:rPr lang="zh-TW" altLang="en-US" dirty="0"/>
+              <a:t>口</a:t>
+            </a:r>
+            <a:r>
+              <a:rPr lang="en-US" altLang="zh-TW" dirty="0"/>
+              <a:t>buy call</a:t>
+            </a:r>
+          </a:p>
+          <a:p>
+            <a:pPr lvl="1"/>
+            <a:r>
+              <a:rPr lang="zh-TW" altLang="en-US" dirty="0"/>
+              <a:t>成交價由</a:t>
+            </a:r>
+            <a:r>
+              <a:rPr lang="en-US" altLang="zh-TW" dirty="0" err="1"/>
+              <a:t>globals.buy_call_price</a:t>
+            </a:r>
+            <a:r>
+              <a:rPr lang="zh-TW" altLang="en-US" dirty="0"/>
+              <a:t>決定，預設</a:t>
+            </a:r>
+            <a:r>
+              <a:rPr lang="en-US" altLang="zh-TW" dirty="0"/>
+              <a:t>0.1</a:t>
+            </a:r>
+          </a:p>
+          <a:p>
+            <a:pPr lvl="1"/>
+            <a:r>
+              <a:rPr lang="en-US" altLang="zh-TW" dirty="0"/>
+              <a:t>N</a:t>
+            </a:r>
+            <a:r>
+              <a:rPr lang="zh-TW" altLang="en-US" dirty="0"/>
+              <a:t>由</a:t>
+            </a:r>
+            <a:r>
+              <a:rPr lang="en-US" altLang="zh-TW" dirty="0" err="1"/>
+              <a:t>globals.buy_call_quatity</a:t>
+            </a:r>
+            <a:r>
+              <a:rPr lang="zh-TW" altLang="en-US" dirty="0"/>
+              <a:t>決定</a:t>
+            </a:r>
+          </a:p>
+          <a:p>
+            <a:r>
+              <a:rPr lang="zh-TW" altLang="en-US" dirty="0"/>
+              <a:t>跌停價說明</a:t>
+            </a:r>
+            <a:r>
+              <a:rPr lang="en-US" altLang="zh-TW" dirty="0"/>
+              <a:t>1: </a:t>
+            </a:r>
+            <a:r>
+              <a:rPr lang="zh-TW" altLang="en-US" dirty="0"/>
+              <a:t>假設昨日收盤</a:t>
+            </a:r>
+            <a:r>
+              <a:rPr lang="en-US" altLang="zh-TW" dirty="0"/>
+              <a:t>15000</a:t>
+            </a:r>
+            <a:r>
+              <a:rPr lang="zh-TW" altLang="en-US" dirty="0"/>
+              <a:t>，則今天掛</a:t>
+            </a:r>
+            <a:r>
+              <a:rPr lang="en-US" altLang="zh-TW" dirty="0"/>
+              <a:t>buy call 15000 - 1500 = 13500</a:t>
+            </a:r>
+          </a:p>
+          <a:p>
+            <a:r>
+              <a:rPr lang="zh-TW" altLang="en-US" dirty="0"/>
+              <a:t>跌停價說明</a:t>
+            </a:r>
+            <a:r>
+              <a:rPr lang="en-US" altLang="zh-TW" dirty="0"/>
+              <a:t>2: </a:t>
+            </a:r>
+            <a:r>
+              <a:rPr lang="zh-TW" altLang="en-US" dirty="0"/>
+              <a:t>假設昨日收盤</a:t>
+            </a:r>
+            <a:r>
+              <a:rPr lang="en-US" altLang="zh-TW" dirty="0"/>
+              <a:t>16668</a:t>
+            </a:r>
+            <a:r>
+              <a:rPr lang="zh-TW" altLang="en-US" dirty="0"/>
+              <a:t>，則今天掛</a:t>
+            </a:r>
+            <a:r>
+              <a:rPr lang="en-US" altLang="zh-TW" dirty="0"/>
+              <a:t>buy call 16650 - 1665 = 14985</a:t>
+            </a:r>
+            <a:r>
+              <a:rPr lang="zh-TW" altLang="en-US" dirty="0"/>
+              <a:t>，取整變</a:t>
+            </a:r>
+            <a:r>
+              <a:rPr lang="en-US" altLang="zh-TW"/>
+              <a:t>15000</a:t>
+            </a:r>
+            <a:endParaRPr lang="zh-TW" altLang="en-US" dirty="0"/>
+          </a:p>
+        </p:txBody>
+      </p:sp>
+    </p:spTree>
+    <p:extLst>
+      <p:ext uri="{BB962C8B-B14F-4D97-AF65-F5344CB8AC3E}">
+        <p14:creationId xmlns:p14="http://schemas.microsoft.com/office/powerpoint/2010/main" val="1282903125"/>
+      </p:ext>
+    </p:extLst>
+  </p:cSld>
+  <p:clrMapOvr>
+    <a:masterClrMapping/>
+  </p:clrMapOvr>
+</p:sld>
+</file>
+
+<file path=ppt/slides/slide14.xml><?xml version="1.0" encoding="utf-8"?>
 <p:sld xmlns:a="http://schemas.openxmlformats.org/drawingml/2006/main" xmlns:r="http://schemas.openxmlformats.org/officeDocument/2006/relationships" xmlns:p="http://schemas.openxmlformats.org/presentationml/2006/main">
   <p:cSld>
     <p:spTree>
@@ -4164,7 +4385,7 @@
 </p:sld>
 </file>
 
-<file path=ppt/slides/slide14.xml><?xml version="1.0" encoding="utf-8"?>
+<file path=ppt/slides/slide15.xml><?xml version="1.0" encoding="utf-8"?>
 <p:sld xmlns:a="http://schemas.openxmlformats.org/drawingml/2006/main" xmlns:r="http://schemas.openxmlformats.org/officeDocument/2006/relationships" xmlns:p="http://schemas.openxmlformats.org/presentationml/2006/main">
   <p:cSld>
     <p:spTree>
@@ -4346,7 +4567,7 @@
 </p:sld>
 </file>
 
-<file path=ppt/slides/slide15.xml><?xml version="1.0" encoding="utf-8"?>
+<file path=ppt/slides/slide16.xml><?xml version="1.0" encoding="utf-8"?>
 <p:sld xmlns:a="http://schemas.openxmlformats.org/drawingml/2006/main" xmlns:r="http://schemas.openxmlformats.org/officeDocument/2006/relationships" xmlns:p="http://schemas.openxmlformats.org/presentationml/2006/main">
   <p:cSld>
     <p:spTree>

</xml_diff>

<commit_message>
Fix buy call error
</commit_message>
<xml_diff>
--- a/選擇權自動化.pptx
+++ b/選擇權自動化.pptx
@@ -4088,6 +4088,22 @@
             </a:r>
             <a:r>
               <a:rPr lang="zh-TW" altLang="en-US" dirty="0"/>
+              <a:t> </a:t>
+            </a:r>
+            <a:r>
+              <a:rPr lang="en-US" altLang="zh-TW" dirty="0"/>
+              <a:t>+</a:t>
+            </a:r>
+            <a:r>
+              <a:rPr lang="zh-TW" altLang="en-US" dirty="0"/>
+              <a:t> </a:t>
+            </a:r>
+            <a:r>
+              <a:rPr lang="en-US" altLang="zh-TW" dirty="0"/>
+              <a:t>200</a:t>
+            </a:r>
+            <a:r>
+              <a:rPr lang="zh-TW" altLang="en-US" dirty="0"/>
               <a:t>，</a:t>
             </a:r>
             <a:r>
@@ -4164,7 +4180,23 @@
             </a:r>
             <a:r>
               <a:rPr lang="en-US" altLang="zh-TW" dirty="0"/>
-              <a:t>buy call 15000 - 1500 = 13500</a:t>
+              <a:t>buy call 15000 - 1500 +</a:t>
+            </a:r>
+            <a:r>
+              <a:rPr lang="zh-TW" altLang="en-US" dirty="0"/>
+              <a:t> </a:t>
+            </a:r>
+            <a:r>
+              <a:rPr lang="en-US" altLang="zh-TW" dirty="0"/>
+              <a:t>200</a:t>
+            </a:r>
+            <a:r>
+              <a:rPr lang="zh-TW" altLang="en-US" dirty="0"/>
+              <a:t> </a:t>
+            </a:r>
+            <a:r>
+              <a:rPr lang="en-US" altLang="zh-TW" dirty="0"/>
+              <a:t>= 13700</a:t>
             </a:r>
           </a:p>
           <a:p>
@@ -4190,16 +4222,41 @@
             </a:r>
             <a:r>
               <a:rPr lang="en-US" altLang="zh-TW" dirty="0"/>
-              <a:t>buy call 16650 - 1665 = 14985</a:t>
+              <a:t>buy call 16650 - 1665 </a:t>
+            </a:r>
+            <a:r>
+              <a:rPr lang="zh-TW" altLang="en-US" dirty="0"/>
+              <a:t> </a:t>
+            </a:r>
+            <a:r>
+              <a:rPr lang="en-US" altLang="zh-TW" dirty="0"/>
+              <a:t>+</a:t>
+            </a:r>
+            <a:r>
+              <a:rPr lang="zh-TW" altLang="en-US" dirty="0"/>
+              <a:t> </a:t>
+            </a:r>
+            <a:r>
+              <a:rPr lang="en-US" altLang="zh-TW" dirty="0"/>
+              <a:t>200</a:t>
+            </a:r>
+            <a:r>
+              <a:rPr lang="zh-TW" altLang="en-US" dirty="0"/>
+              <a:t> </a:t>
+            </a:r>
+            <a:r>
+              <a:rPr lang="en-US" altLang="zh-TW" dirty="0"/>
+              <a:t>= 15185</a:t>
             </a:r>
             <a:r>
               <a:rPr lang="zh-TW" altLang="en-US" dirty="0"/>
               <a:t>，取整變</a:t>
             </a:r>
             <a:r>
-              <a:rPr lang="en-US" altLang="zh-TW" dirty="0"/>
-              <a:t>15000</a:t>
-            </a:r>
+              <a:rPr lang="en-US" altLang="zh-TW"/>
+              <a:t>15200</a:t>
+            </a:r>
+            <a:endParaRPr lang="en-US" altLang="zh-TW" dirty="0"/>
           </a:p>
           <a:p>
             <a:r>
@@ -4211,10 +4268,9 @@
               <a:t>100</a:t>
             </a:r>
             <a:r>
-              <a:rPr lang="zh-TW" altLang="en-US"/>
+              <a:rPr lang="zh-TW" altLang="en-US" dirty="0"/>
               <a:t>點一跳</a:t>
             </a:r>
-            <a:endParaRPr lang="zh-TW" altLang="en-US" dirty="0"/>
           </a:p>
         </p:txBody>
       </p:sp>

</xml_diff>